<commit_message>
20240706 Commit from Win PC Working Solution
</commit_message>
<xml_diff>
--- a/Reporting/SECMC EEM Deck v4.0.pptx
+++ b/Reporting/SECMC EEM Deck v4.0.pptx
@@ -5,7 +5,7 @@
     <p:sldMasterId id="2147483648" r:id="rId4"/>
   </p:sldMasterIdLst>
   <p:notesMasterIdLst>
-    <p:notesMasterId r:id="rId29"/>
+    <p:notesMasterId r:id="rId39"/>
   </p:notesMasterIdLst>
   <p:sldIdLst>
     <p:sldId id="256" r:id="rId5"/>
@@ -26,12 +26,22 @@
     <p:sldId id="392" r:id="rId20"/>
     <p:sldId id="406" r:id="rId21"/>
     <p:sldId id="393" r:id="rId22"/>
-    <p:sldId id="410" r:id="rId23"/>
-    <p:sldId id="416" r:id="rId24"/>
-    <p:sldId id="414" r:id="rId25"/>
-    <p:sldId id="411" r:id="rId26"/>
-    <p:sldId id="402" r:id="rId27"/>
-    <p:sldId id="284" r:id="rId28"/>
+    <p:sldId id="420" r:id="rId23"/>
+    <p:sldId id="418" r:id="rId24"/>
+    <p:sldId id="419" r:id="rId25"/>
+    <p:sldId id="421" r:id="rId26"/>
+    <p:sldId id="425" r:id="rId27"/>
+    <p:sldId id="422" r:id="rId28"/>
+    <p:sldId id="423" r:id="rId29"/>
+    <p:sldId id="426" r:id="rId30"/>
+    <p:sldId id="424" r:id="rId31"/>
+    <p:sldId id="427" r:id="rId32"/>
+    <p:sldId id="410" r:id="rId33"/>
+    <p:sldId id="416" r:id="rId34"/>
+    <p:sldId id="414" r:id="rId35"/>
+    <p:sldId id="411" r:id="rId36"/>
+    <p:sldId id="428" r:id="rId37"/>
+    <p:sldId id="284" r:id="rId38"/>
   </p:sldIdLst>
   <p:sldSz cx="12192000" cy="6858000"/>
   <p:notesSz cx="6858000" cy="9144000"/>
@@ -131,6 +141,52 @@
     </a:lvl9pPr>
   </p:defaultTextStyle>
   <p:extLst>
+    <p:ext uri="{521415D9-36F7-43E2-AB2F-B90AF26B5E84}">
+      <p14:sectionLst xmlns:p14="http://schemas.microsoft.com/office/powerpoint/2010/main">
+        <p14:section name="Default Section" id="{5858E119-2F73-41E1-BF7B-177C78F221F6}">
+          <p14:sldIdLst>
+            <p14:sldId id="256"/>
+            <p14:sldId id="264"/>
+            <p14:sldId id="259"/>
+            <p14:sldId id="396"/>
+            <p14:sldId id="407"/>
+            <p14:sldId id="403"/>
+            <p14:sldId id="397"/>
+            <p14:sldId id="401"/>
+            <p14:sldId id="398"/>
+            <p14:sldId id="404"/>
+            <p14:sldId id="390"/>
+            <p14:sldId id="391"/>
+            <p14:sldId id="417"/>
+            <p14:sldId id="405"/>
+            <p14:sldId id="400"/>
+            <p14:sldId id="392"/>
+            <p14:sldId id="406"/>
+            <p14:sldId id="393"/>
+            <p14:sldId id="420"/>
+            <p14:sldId id="418"/>
+            <p14:sldId id="419"/>
+            <p14:sldId id="421"/>
+            <p14:sldId id="425"/>
+            <p14:sldId id="422"/>
+            <p14:sldId id="423"/>
+            <p14:sldId id="426"/>
+            <p14:sldId id="424"/>
+            <p14:sldId id="427"/>
+            <p14:sldId id="410"/>
+            <p14:sldId id="416"/>
+            <p14:sldId id="414"/>
+            <p14:sldId id="411"/>
+          </p14:sldIdLst>
+        </p14:section>
+        <p14:section name="Untitled Section" id="{D6159FBE-7FCE-4448-BA03-0573E10995FC}">
+          <p14:sldIdLst>
+            <p14:sldId id="428"/>
+            <p14:sldId id="284"/>
+          </p14:sldIdLst>
+        </p14:section>
+      </p14:sectionLst>
+    </p:ext>
     <p:ext uri="{EFAFB233-063F-42B5-8137-9DF3F51BA10A}">
       <p15:sldGuideLst xmlns:p15="http://schemas.microsoft.com/office/powerpoint/2012/main"/>
     </p:ext>
@@ -161,7 +217,7 @@
 <file path=ppt/charts/chart1.xml><?xml version="1.0" encoding="utf-8"?>
 <c:chartSpace xmlns:c="http://schemas.openxmlformats.org/drawingml/2006/chart" xmlns:a="http://schemas.openxmlformats.org/drawingml/2006/main" xmlns:r="http://schemas.openxmlformats.org/officeDocument/2006/relationships" xmlns:c16r2="http://schemas.microsoft.com/office/drawing/2015/06/chart">
   <c:date1904 val="0"/>
-  <c:lang val="en-GB"/>
+  <c:lang val="en-US"/>
   <c:roundedCorners val="0"/>
   <mc:AlternateContent xmlns:mc="http://schemas.openxmlformats.org/markup-compatibility/2006">
     <mc:Choice xmlns:c14="http://schemas.microsoft.com/office/drawing/2007/8/2/chart" Requires="c14">
@@ -986,7 +1042,7 @@
 <file path=ppt/charts/chart2.xml><?xml version="1.0" encoding="utf-8"?>
 <c:chartSpace xmlns:c="http://schemas.openxmlformats.org/drawingml/2006/chart" xmlns:a="http://schemas.openxmlformats.org/drawingml/2006/main" xmlns:r="http://schemas.openxmlformats.org/officeDocument/2006/relationships" xmlns:c16r2="http://schemas.microsoft.com/office/drawing/2015/06/chart">
   <c:date1904 val="0"/>
-  <c:lang val="en-GB"/>
+  <c:lang val="en-US"/>
   <c:roundedCorners val="0"/>
   <mc:AlternateContent xmlns:mc="http://schemas.openxmlformats.org/markup-compatibility/2006">
     <mc:Choice xmlns:c14="http://schemas.microsoft.com/office/drawing/2007/8/2/chart" Requires="c14">
@@ -4135,17 +4191,17 @@
     <dgm:cxn modelId="{57F6133E-5C7D-3D47-8380-F56089DCCBF7}" type="presOf" srcId="{83A9385E-9BA3-451C-93E5-D1CCC84E1E3A}" destId="{08473C69-C335-44A8-A5A3-CE4D4C23E408}" srcOrd="0" destOrd="0" presId="urn:microsoft.com/office/officeart/2005/8/layout/bProcess3"/>
     <dgm:cxn modelId="{A01D753E-232A-D54F-A90D-409A50E15E94}" srcId="{831CC19F-8BD7-436F-9351-E93347D9E772}" destId="{D9EC65D2-FE84-D44A-A8BA-B7909BBAAFA5}" srcOrd="12" destOrd="0" parTransId="{E1463989-1D68-7244-8A77-AA365C906248}" sibTransId="{CFBA75B8-3563-124D-8671-BBFA985C6FE9}"/>
     <dgm:cxn modelId="{AC634A40-5759-D245-807D-BC191F97CE0D}" type="presOf" srcId="{CFBA75B8-3563-124D-8671-BBFA985C6FE9}" destId="{347DCD0C-2FF3-E04F-845A-20D293E6BC9C}" srcOrd="0" destOrd="0" presId="urn:microsoft.com/office/officeart/2005/8/layout/bProcess3"/>
+    <dgm:cxn modelId="{111FDE61-C0F3-0342-BDAB-D5894328FA57}" type="presOf" srcId="{836FBFF5-AECE-435B-ADDE-7E555416F5F6}" destId="{02F5644E-C7C8-446F-89BE-2CCD45F8BB67}" srcOrd="0" destOrd="0" presId="urn:microsoft.com/office/officeart/2005/8/layout/bProcess3"/>
+    <dgm:cxn modelId="{175C2165-E421-46FE-A52A-8FA6281CBAC3}" srcId="{831CC19F-8BD7-436F-9351-E93347D9E772}" destId="{34819ED5-6D44-45B0-90B0-5A63E569A2EB}" srcOrd="4" destOrd="0" parTransId="{42107CA5-C6AE-4730-A5E8-3CB7B318A7E3}" sibTransId="{A2EF8CA1-2B9A-47CF-9337-3CAD7F2D9A68}"/>
+    <dgm:cxn modelId="{E3BEA965-7454-D542-B6A6-7C66FAE1986D}" type="presOf" srcId="{1140E34D-17CD-4830-BB3C-E8EFA3A1277E}" destId="{F94AE699-C9FF-42EA-B6A7-787780C8A342}" srcOrd="0" destOrd="0" presId="urn:microsoft.com/office/officeart/2005/8/layout/bProcess3"/>
     <dgm:cxn modelId="{B596E847-11C3-49EC-B0AB-D7DE35CF1FCC}" srcId="{831CC19F-8BD7-436F-9351-E93347D9E772}" destId="{5CC7EFB9-FB2F-48C6-B7B6-A22EECC9DEAD}" srcOrd="8" destOrd="0" parTransId="{0205FFD5-38EF-435A-991F-D1B70B6EFC1E}" sibTransId="{B5B59F18-FF9A-40FC-9FF8-AD1D3BFE5E67}"/>
+    <dgm:cxn modelId="{A2D0DD68-FD1E-459D-B1CA-F3B277171CB9}" type="presOf" srcId="{831CC19F-8BD7-436F-9351-E93347D9E772}" destId="{0B74FD34-9D17-42D3-A87D-C7BD996CE717}" srcOrd="0" destOrd="0" presId="urn:microsoft.com/office/officeart/2005/8/layout/bProcess3"/>
     <dgm:cxn modelId="{EE922749-1431-5B42-B6B2-BF6CC74F8F9C}" type="presOf" srcId="{C833B8C4-6F72-4A93-9886-E20A39D7E77F}" destId="{5858FCDB-38B4-48E1-BC87-012B1708280C}" srcOrd="1" destOrd="0" presId="urn:microsoft.com/office/officeart/2005/8/layout/bProcess3"/>
     <dgm:cxn modelId="{3AC5EA4B-B975-4BB9-8E51-E5386F71108D}" srcId="{831CC19F-8BD7-436F-9351-E93347D9E772}" destId="{6E01A27B-8C41-4A66-93B9-F047959F51B1}" srcOrd="2" destOrd="0" parTransId="{591239FF-94A5-4DFC-8337-4D140AF7B0B0}" sibTransId="{83A9385E-9BA3-451C-93E5-D1CCC84E1E3A}"/>
     <dgm:cxn modelId="{D970FA4D-056B-414D-BF2E-832283F227EB}" type="presOf" srcId="{6E01A27B-8C41-4A66-93B9-F047959F51B1}" destId="{65BAD743-E387-4784-8CD0-81A80A117310}" srcOrd="0" destOrd="0" presId="urn:microsoft.com/office/officeart/2005/8/layout/bProcess3"/>
     <dgm:cxn modelId="{DE54694F-AB6E-A741-AF96-5267AA559F8B}" type="presOf" srcId="{5CC7EFB9-FB2F-48C6-B7B6-A22EECC9DEAD}" destId="{F93A867E-A056-4C6A-9A6E-15638B2E5C6C}" srcOrd="0" destOrd="0" presId="urn:microsoft.com/office/officeart/2005/8/layout/bProcess3"/>
     <dgm:cxn modelId="{DF8AA653-65C5-4AB9-AEF1-FE4CE93C498D}" srcId="{831CC19F-8BD7-436F-9351-E93347D9E772}" destId="{836FBFF5-AECE-435B-ADDE-7E555416F5F6}" srcOrd="6" destOrd="0" parTransId="{D2A838F5-5AB2-4D66-9365-30DA039F7EEB}" sibTransId="{1140E34D-17CD-4830-BB3C-E8EFA3A1277E}"/>
     <dgm:cxn modelId="{7ADE865A-843C-AE48-8116-B00C0238D333}" type="presOf" srcId="{CFBA75B8-3563-124D-8671-BBFA985C6FE9}" destId="{775AE915-A777-3F4F-9BF6-1AE4C3E4096E}" srcOrd="1" destOrd="0" presId="urn:microsoft.com/office/officeart/2005/8/layout/bProcess3"/>
-    <dgm:cxn modelId="{111FDE61-C0F3-0342-BDAB-D5894328FA57}" type="presOf" srcId="{836FBFF5-AECE-435B-ADDE-7E555416F5F6}" destId="{02F5644E-C7C8-446F-89BE-2CCD45F8BB67}" srcOrd="0" destOrd="0" presId="urn:microsoft.com/office/officeart/2005/8/layout/bProcess3"/>
-    <dgm:cxn modelId="{175C2165-E421-46FE-A52A-8FA6281CBAC3}" srcId="{831CC19F-8BD7-436F-9351-E93347D9E772}" destId="{34819ED5-6D44-45B0-90B0-5A63E569A2EB}" srcOrd="4" destOrd="0" parTransId="{42107CA5-C6AE-4730-A5E8-3CB7B318A7E3}" sibTransId="{A2EF8CA1-2B9A-47CF-9337-3CAD7F2D9A68}"/>
-    <dgm:cxn modelId="{E3BEA965-7454-D542-B6A6-7C66FAE1986D}" type="presOf" srcId="{1140E34D-17CD-4830-BB3C-E8EFA3A1277E}" destId="{F94AE699-C9FF-42EA-B6A7-787780C8A342}" srcOrd="0" destOrd="0" presId="urn:microsoft.com/office/officeart/2005/8/layout/bProcess3"/>
-    <dgm:cxn modelId="{A2D0DD68-FD1E-459D-B1CA-F3B277171CB9}" type="presOf" srcId="{831CC19F-8BD7-436F-9351-E93347D9E772}" destId="{0B74FD34-9D17-42D3-A87D-C7BD996CE717}" srcOrd="0" destOrd="0" presId="urn:microsoft.com/office/officeart/2005/8/layout/bProcess3"/>
     <dgm:cxn modelId="{B6E5837C-B96A-D34E-83C7-AEC1D714EC24}" type="presOf" srcId="{81DFA529-97B6-AB48-A255-5D0FA705066D}" destId="{87692273-8DC7-8647-8AB1-9B5971405C37}" srcOrd="0" destOrd="0" presId="urn:microsoft.com/office/officeart/2005/8/layout/bProcess3"/>
     <dgm:cxn modelId="{FBFAF77D-FA54-774A-9856-B84C2DA7C537}" type="presOf" srcId="{579C5D85-A701-0148-8F36-C7FFA8C8BACA}" destId="{27912D64-79B2-C245-9362-AABA1DF2AF6A}" srcOrd="0" destOrd="0" presId="urn:microsoft.com/office/officeart/2005/8/layout/bProcess3"/>
     <dgm:cxn modelId="{968F4887-3149-0449-A424-7FA6FE65B3CF}" type="presOf" srcId="{C48B0053-F04F-2E4F-913C-B7BF5C8790F5}" destId="{DDF43BAA-8BE0-ED40-8CBC-95CFF82E91DB}" srcOrd="0" destOrd="0" presId="urn:microsoft.com/office/officeart/2005/8/layout/bProcess3"/>
@@ -8050,7 +8106,7 @@
           <a:p>
             <a:fld id="{A4D6281A-26E8-41EC-9CF0-41E2DC751A3F}" type="datetimeFigureOut">
               <a:rPr lang="en-US" smtClean="0"/>
-              <a:t>5/2/24</a:t>
+              <a:t>5/3/2024</a:t>
             </a:fld>
             <a:endParaRPr lang="en-US"/>
           </a:p>
@@ -8470,7 +8526,7 @@
     </p:spTree>
     <p:extLst>
       <p:ext uri="{BB962C8B-B14F-4D97-AF65-F5344CB8AC3E}">
-        <p14:creationId xmlns:p14="http://schemas.microsoft.com/office/powerpoint/2010/main" val="3335505387"/>
+        <p14:creationId xmlns:p14="http://schemas.microsoft.com/office/powerpoint/2010/main" val="1856602521"/>
       </p:ext>
     </p:extLst>
   </p:cSld>
@@ -8546,6 +8602,258 @@
             <a:fld id="{F50F48A9-80A0-4937-9799-785FFDD6231D}" type="slidenum">
               <a:rPr lang="en-US" smtClean="0"/>
               <a:t>20</a:t>
+            </a:fld>
+            <a:endParaRPr lang="en-US"/>
+          </a:p>
+        </p:txBody>
+      </p:sp>
+    </p:spTree>
+    <p:extLst>
+      <p:ext uri="{BB962C8B-B14F-4D97-AF65-F5344CB8AC3E}">
+        <p14:creationId xmlns:p14="http://schemas.microsoft.com/office/powerpoint/2010/main" val="334810333"/>
+      </p:ext>
+    </p:extLst>
+  </p:cSld>
+  <p:clrMapOvr>
+    <a:masterClrMapping/>
+  </p:clrMapOvr>
+</p:notes>
+</file>
+
+<file path=ppt/notesSlides/notesSlide4.xml><?xml version="1.0" encoding="utf-8"?>
+<p:notes xmlns:a="http://schemas.openxmlformats.org/drawingml/2006/main" xmlns:r="http://schemas.openxmlformats.org/officeDocument/2006/relationships" xmlns:p="http://schemas.openxmlformats.org/presentationml/2006/main">
+  <p:cSld>
+    <p:spTree>
+      <p:nvGrpSpPr>
+        <p:cNvPr id="1" name=""/>
+        <p:cNvGrpSpPr/>
+        <p:nvPr/>
+      </p:nvGrpSpPr>
+      <p:grpSpPr>
+        <a:xfrm>
+          <a:off x="0" y="0"/>
+          <a:ext cx="0" cy="0"/>
+          <a:chOff x="0" y="0"/>
+          <a:chExt cx="0" cy="0"/>
+        </a:xfrm>
+      </p:grpSpPr>
+      <p:sp>
+        <p:nvSpPr>
+          <p:cNvPr id="2" name="Slide Image Placeholder 1"/>
+          <p:cNvSpPr>
+            <a:spLocks noGrp="1" noRot="1" noChangeAspect="1"/>
+          </p:cNvSpPr>
+          <p:nvPr>
+            <p:ph type="sldImg"/>
+          </p:nvPr>
+        </p:nvSpPr>
+        <p:spPr/>
+      </p:sp>
+      <p:sp>
+        <p:nvSpPr>
+          <p:cNvPr id="3" name="Notes Placeholder 2"/>
+          <p:cNvSpPr>
+            <a:spLocks noGrp="1"/>
+          </p:cNvSpPr>
+          <p:nvPr>
+            <p:ph type="body" idx="1"/>
+          </p:nvPr>
+        </p:nvSpPr>
+        <p:spPr/>
+        <p:txBody>
+          <a:bodyPr/>
+          <a:lstStyle/>
+          <a:p>
+            <a:endParaRPr lang="en-US" dirty="0"/>
+          </a:p>
+        </p:txBody>
+      </p:sp>
+      <p:sp>
+        <p:nvSpPr>
+          <p:cNvPr id="4" name="Slide Number Placeholder 3"/>
+          <p:cNvSpPr>
+            <a:spLocks noGrp="1"/>
+          </p:cNvSpPr>
+          <p:nvPr>
+            <p:ph type="sldNum" sz="quarter" idx="5"/>
+          </p:nvPr>
+        </p:nvSpPr>
+        <p:spPr/>
+        <p:txBody>
+          <a:bodyPr/>
+          <a:lstStyle/>
+          <a:p>
+            <a:fld id="{F50F48A9-80A0-4937-9799-785FFDD6231D}" type="slidenum">
+              <a:rPr lang="en-US" smtClean="0"/>
+              <a:t>21</a:t>
+            </a:fld>
+            <a:endParaRPr lang="en-US"/>
+          </a:p>
+        </p:txBody>
+      </p:sp>
+    </p:spTree>
+    <p:extLst>
+      <p:ext uri="{BB962C8B-B14F-4D97-AF65-F5344CB8AC3E}">
+        <p14:creationId xmlns:p14="http://schemas.microsoft.com/office/powerpoint/2010/main" val="63942672"/>
+      </p:ext>
+    </p:extLst>
+  </p:cSld>
+  <p:clrMapOvr>
+    <a:masterClrMapping/>
+  </p:clrMapOvr>
+</p:notes>
+</file>
+
+<file path=ppt/notesSlides/notesSlide5.xml><?xml version="1.0" encoding="utf-8"?>
+<p:notes xmlns:a="http://schemas.openxmlformats.org/drawingml/2006/main" xmlns:r="http://schemas.openxmlformats.org/officeDocument/2006/relationships" xmlns:p="http://schemas.openxmlformats.org/presentationml/2006/main">
+  <p:cSld>
+    <p:spTree>
+      <p:nvGrpSpPr>
+        <p:cNvPr id="1" name=""/>
+        <p:cNvGrpSpPr/>
+        <p:nvPr/>
+      </p:nvGrpSpPr>
+      <p:grpSpPr>
+        <a:xfrm>
+          <a:off x="0" y="0"/>
+          <a:ext cx="0" cy="0"/>
+          <a:chOff x="0" y="0"/>
+          <a:chExt cx="0" cy="0"/>
+        </a:xfrm>
+      </p:grpSpPr>
+      <p:sp>
+        <p:nvSpPr>
+          <p:cNvPr id="2" name="Slide Image Placeholder 1"/>
+          <p:cNvSpPr>
+            <a:spLocks noGrp="1" noRot="1" noChangeAspect="1"/>
+          </p:cNvSpPr>
+          <p:nvPr>
+            <p:ph type="sldImg"/>
+          </p:nvPr>
+        </p:nvSpPr>
+        <p:spPr/>
+      </p:sp>
+      <p:sp>
+        <p:nvSpPr>
+          <p:cNvPr id="3" name="Notes Placeholder 2"/>
+          <p:cNvSpPr>
+            <a:spLocks noGrp="1"/>
+          </p:cNvSpPr>
+          <p:nvPr>
+            <p:ph type="body" idx="1"/>
+          </p:nvPr>
+        </p:nvSpPr>
+        <p:spPr/>
+        <p:txBody>
+          <a:bodyPr/>
+          <a:lstStyle/>
+          <a:p>
+            <a:endParaRPr lang="en-US" dirty="0"/>
+          </a:p>
+        </p:txBody>
+      </p:sp>
+      <p:sp>
+        <p:nvSpPr>
+          <p:cNvPr id="4" name="Slide Number Placeholder 3"/>
+          <p:cNvSpPr>
+            <a:spLocks noGrp="1"/>
+          </p:cNvSpPr>
+          <p:nvPr>
+            <p:ph type="sldNum" sz="quarter" idx="5"/>
+          </p:nvPr>
+        </p:nvSpPr>
+        <p:spPr/>
+        <p:txBody>
+          <a:bodyPr/>
+          <a:lstStyle/>
+          <a:p>
+            <a:fld id="{F50F48A9-80A0-4937-9799-785FFDD6231D}" type="slidenum">
+              <a:rPr lang="en-US" smtClean="0"/>
+              <a:t>29</a:t>
+            </a:fld>
+            <a:endParaRPr lang="en-US"/>
+          </a:p>
+        </p:txBody>
+      </p:sp>
+    </p:spTree>
+    <p:extLst>
+      <p:ext uri="{BB962C8B-B14F-4D97-AF65-F5344CB8AC3E}">
+        <p14:creationId xmlns:p14="http://schemas.microsoft.com/office/powerpoint/2010/main" val="3335505387"/>
+      </p:ext>
+    </p:extLst>
+  </p:cSld>
+  <p:clrMapOvr>
+    <a:masterClrMapping/>
+  </p:clrMapOvr>
+</p:notes>
+</file>
+
+<file path=ppt/notesSlides/notesSlide6.xml><?xml version="1.0" encoding="utf-8"?>
+<p:notes xmlns:a="http://schemas.openxmlformats.org/drawingml/2006/main" xmlns:r="http://schemas.openxmlformats.org/officeDocument/2006/relationships" xmlns:p="http://schemas.openxmlformats.org/presentationml/2006/main">
+  <p:cSld>
+    <p:spTree>
+      <p:nvGrpSpPr>
+        <p:cNvPr id="1" name=""/>
+        <p:cNvGrpSpPr/>
+        <p:nvPr/>
+      </p:nvGrpSpPr>
+      <p:grpSpPr>
+        <a:xfrm>
+          <a:off x="0" y="0"/>
+          <a:ext cx="0" cy="0"/>
+          <a:chOff x="0" y="0"/>
+          <a:chExt cx="0" cy="0"/>
+        </a:xfrm>
+      </p:grpSpPr>
+      <p:sp>
+        <p:nvSpPr>
+          <p:cNvPr id="2" name="Slide Image Placeholder 1"/>
+          <p:cNvSpPr>
+            <a:spLocks noGrp="1" noRot="1" noChangeAspect="1"/>
+          </p:cNvSpPr>
+          <p:nvPr>
+            <p:ph type="sldImg"/>
+          </p:nvPr>
+        </p:nvSpPr>
+        <p:spPr/>
+      </p:sp>
+      <p:sp>
+        <p:nvSpPr>
+          <p:cNvPr id="3" name="Notes Placeholder 2"/>
+          <p:cNvSpPr>
+            <a:spLocks noGrp="1"/>
+          </p:cNvSpPr>
+          <p:nvPr>
+            <p:ph type="body" idx="1"/>
+          </p:nvPr>
+        </p:nvSpPr>
+        <p:spPr/>
+        <p:txBody>
+          <a:bodyPr/>
+          <a:lstStyle/>
+          <a:p>
+            <a:endParaRPr lang="en-US" dirty="0"/>
+          </a:p>
+        </p:txBody>
+      </p:sp>
+      <p:sp>
+        <p:nvSpPr>
+          <p:cNvPr id="4" name="Slide Number Placeholder 3"/>
+          <p:cNvSpPr>
+            <a:spLocks noGrp="1"/>
+          </p:cNvSpPr>
+          <p:nvPr>
+            <p:ph type="sldNum" sz="quarter" idx="5"/>
+          </p:nvPr>
+        </p:nvSpPr>
+        <p:spPr/>
+        <p:txBody>
+          <a:bodyPr/>
+          <a:lstStyle/>
+          <a:p>
+            <a:fld id="{F50F48A9-80A0-4937-9799-785FFDD6231D}" type="slidenum">
+              <a:rPr lang="en-US" smtClean="0"/>
+              <a:t>30</a:t>
             </a:fld>
             <a:endParaRPr lang="en-US"/>
           </a:p>
@@ -8711,7 +9019,7 @@
           <a:p>
             <a:fld id="{E9C28301-50EF-41F1-8374-845A999CCC6B}" type="datetimeFigureOut">
               <a:rPr lang="en-US" smtClean="0"/>
-              <a:t>5/2/24</a:t>
+              <a:t>5/3/2024</a:t>
             </a:fld>
             <a:endParaRPr lang="en-US"/>
           </a:p>
@@ -8909,7 +9217,7 @@
           <a:p>
             <a:fld id="{E9C28301-50EF-41F1-8374-845A999CCC6B}" type="datetimeFigureOut">
               <a:rPr lang="en-US" smtClean="0"/>
-              <a:t>5/2/24</a:t>
+              <a:t>5/3/2024</a:t>
             </a:fld>
             <a:endParaRPr lang="en-US"/>
           </a:p>
@@ -9117,7 +9425,7 @@
           <a:p>
             <a:fld id="{E9C28301-50EF-41F1-8374-845A999CCC6B}" type="datetimeFigureOut">
               <a:rPr lang="en-US" smtClean="0"/>
-              <a:t>5/2/24</a:t>
+              <a:t>5/3/2024</a:t>
             </a:fld>
             <a:endParaRPr lang="en-US"/>
           </a:p>
@@ -9315,7 +9623,7 @@
           <a:p>
             <a:fld id="{E9C28301-50EF-41F1-8374-845A999CCC6B}" type="datetimeFigureOut">
               <a:rPr lang="en-US" smtClean="0"/>
-              <a:t>5/2/24</a:t>
+              <a:t>5/3/2024</a:t>
             </a:fld>
             <a:endParaRPr lang="en-US"/>
           </a:p>
@@ -9590,7 +9898,7 @@
           <a:p>
             <a:fld id="{E9C28301-50EF-41F1-8374-845A999CCC6B}" type="datetimeFigureOut">
               <a:rPr lang="en-US" smtClean="0"/>
-              <a:t>5/2/24</a:t>
+              <a:t>5/3/2024</a:t>
             </a:fld>
             <a:endParaRPr lang="en-US"/>
           </a:p>
@@ -9855,7 +10163,7 @@
           <a:p>
             <a:fld id="{E9C28301-50EF-41F1-8374-845A999CCC6B}" type="datetimeFigureOut">
               <a:rPr lang="en-US" smtClean="0"/>
-              <a:t>5/2/24</a:t>
+              <a:t>5/3/2024</a:t>
             </a:fld>
             <a:endParaRPr lang="en-US"/>
           </a:p>
@@ -10267,7 +10575,7 @@
           <a:p>
             <a:fld id="{E9C28301-50EF-41F1-8374-845A999CCC6B}" type="datetimeFigureOut">
               <a:rPr lang="en-US" smtClean="0"/>
-              <a:t>5/2/24</a:t>
+              <a:t>5/3/2024</a:t>
             </a:fld>
             <a:endParaRPr lang="en-US"/>
           </a:p>
@@ -10408,7 +10716,7 @@
           <a:p>
             <a:fld id="{E9C28301-50EF-41F1-8374-845A999CCC6B}" type="datetimeFigureOut">
               <a:rPr lang="en-US" smtClean="0"/>
-              <a:t>5/2/24</a:t>
+              <a:t>5/3/2024</a:t>
             </a:fld>
             <a:endParaRPr lang="en-US"/>
           </a:p>
@@ -10521,7 +10829,7 @@
           <a:p>
             <a:fld id="{E9C28301-50EF-41F1-8374-845A999CCC6B}" type="datetimeFigureOut">
               <a:rPr lang="en-US" smtClean="0"/>
-              <a:t>5/2/24</a:t>
+              <a:t>5/3/2024</a:t>
             </a:fld>
             <a:endParaRPr lang="en-US"/>
           </a:p>
@@ -10832,7 +11140,7 @@
           <a:p>
             <a:fld id="{E9C28301-50EF-41F1-8374-845A999CCC6B}" type="datetimeFigureOut">
               <a:rPr lang="en-US" smtClean="0"/>
-              <a:t>5/2/24</a:t>
+              <a:t>5/3/2024</a:t>
             </a:fld>
             <a:endParaRPr lang="en-US"/>
           </a:p>
@@ -11120,7 +11428,7 @@
           <a:p>
             <a:fld id="{E9C28301-50EF-41F1-8374-845A999CCC6B}" type="datetimeFigureOut">
               <a:rPr lang="en-US" smtClean="0"/>
-              <a:t>5/2/24</a:t>
+              <a:t>5/3/2024</a:t>
             </a:fld>
             <a:endParaRPr lang="en-US"/>
           </a:p>
@@ -11361,7 +11669,7 @@
           <a:p>
             <a:fld id="{E9C28301-50EF-41F1-8374-845A999CCC6B}" type="datetimeFigureOut">
               <a:rPr lang="en-US" smtClean="0"/>
-              <a:t>5/2/24</a:t>
+              <a:t>5/3/2024</a:t>
             </a:fld>
             <a:endParaRPr lang="en-US"/>
           </a:p>
@@ -18949,7 +19257,7 @@
         </p:spPr>
         <p:txBody>
           <a:bodyPr>
-            <a:normAutofit fontScale="90000"/>
+            <a:normAutofit/>
           </a:bodyPr>
           <a:lstStyle/>
           <a:p>
@@ -22500,7 +22808,7 @@
         <p:spPr>
           <a:xfrm>
             <a:off x="8756073" y="1356531"/>
-            <a:ext cx="2895600" cy="4037402"/>
+            <a:ext cx="2895600" cy="3376834"/>
           </a:xfrm>
           <a:prstGeom prst="borderCallout2">
             <a:avLst>
@@ -22508,8 +22816,8 @@
               <a:gd name="adj2" fmla="val -199"/>
               <a:gd name="adj3" fmla="val 8455"/>
               <a:gd name="adj4" fmla="val -31500"/>
-              <a:gd name="adj5" fmla="val 46184"/>
-              <a:gd name="adj6" fmla="val -127367"/>
+              <a:gd name="adj5" fmla="val 52555"/>
+              <a:gd name="adj6" fmla="val -125974"/>
             </a:avLst>
           </a:prstGeom>
           <a:ln>
@@ -22538,7 +22846,19 @@
           <a:bodyPr rtlCol="0" anchor="t" anchorCtr="0"/>
           <a:lstStyle/>
           <a:p>
+            <a:r>
+              <a:rPr lang="en-US" dirty="0"/>
+              <a:t>Solar output from the existing 5MW plant remains low throughout the year.</a:t>
+            </a:r>
+          </a:p>
+          <a:p>
             <a:endParaRPr lang="en-US" dirty="0"/>
+          </a:p>
+          <a:p>
+            <a:r>
+              <a:rPr lang="en-US" dirty="0"/>
+              <a:t>However, during highly cloudy conditions in June-August, the average output drops under 200kW per MWp, which severely impacts PV and BESS sizing for options utilizing these sources.</a:t>
+            </a:r>
           </a:p>
         </p:txBody>
       </p:sp>
@@ -26542,8 +26862,8 @@
         </p:nvSpPr>
         <p:spPr>
           <a:xfrm>
-            <a:off x="618776" y="358499"/>
-            <a:ext cx="4084260" cy="646331"/>
+            <a:off x="618775" y="358499"/>
+            <a:ext cx="5822365" cy="646331"/>
           </a:xfrm>
           <a:prstGeom prst="rect">
             <a:avLst/>
@@ -26551,7 +26871,7 @@
           <a:noFill/>
         </p:spPr>
         <p:txBody>
-          <a:bodyPr wrap="none" lIns="91440" tIns="45720" rIns="91440" bIns="45720">
+          <a:bodyPr wrap="square" lIns="91440" tIns="45720" rIns="91440" bIns="45720">
             <a:spAutoFit/>
           </a:bodyPr>
           <a:lstStyle/>
@@ -26571,355 +26891,526 @@
                 </a:effectLst>
                 <a:latin typeface="+mj-lt"/>
               </a:rPr>
-              <a:t>Modeling Outcomes</a:t>
+              <a:t>Scenarios being Modeled</a:t>
             </a:r>
           </a:p>
         </p:txBody>
       </p:sp>
-      <p:graphicFrame>
-        <p:nvGraphicFramePr>
-          <p:cNvPr id="3" name="Table 2">
+      <p:sp>
+        <p:nvSpPr>
+          <p:cNvPr id="5" name="Content Placeholder 3">
             <a:extLst>
               <a:ext uri="{FF2B5EF4-FFF2-40B4-BE49-F238E27FC236}">
-                <a16:creationId xmlns:a16="http://schemas.microsoft.com/office/drawing/2014/main" id="{CFF05B22-0D56-274F-CC71-C6D972773C55}"/>
+                <a16:creationId xmlns:a16="http://schemas.microsoft.com/office/drawing/2014/main" id="{F1AB17C4-1AC5-C125-0B9C-01DC77FCA754}"/>
               </a:ext>
             </a:extLst>
           </p:cNvPr>
-          <p:cNvGraphicFramePr>
-            <a:graphicFrameLocks noGrp="1"/>
-          </p:cNvGraphicFramePr>
-          <p:nvPr>
-            <p:extLst>
-              <p:ext uri="{D42A27DB-BD31-4B8C-83A1-F6EECF244321}">
-                <p14:modId xmlns:p14="http://schemas.microsoft.com/office/powerpoint/2010/main" val="306842031"/>
-              </p:ext>
-            </p:extLst>
-          </p:nvPr>
-        </p:nvGraphicFramePr>
-        <p:xfrm>
-          <a:off x="721625" y="1270126"/>
-          <a:ext cx="10570949" cy="4084320"/>
-        </p:xfrm>
-        <a:graphic>
-          <a:graphicData uri="http://schemas.openxmlformats.org/drawingml/2006/table">
-            <a:tbl>
-              <a:tblPr firstRow="1" bandRow="1">
-                <a:tableStyleId>{5C22544A-7EE6-4342-B048-85BDC9FD1C3A}</a:tableStyleId>
-              </a:tblPr>
-              <a:tblGrid>
-                <a:gridCol w="637275">
-                  <a:extLst>
-                    <a:ext uri="{9D8B030D-6E8A-4147-A177-3AD203B41FA5}">
-                      <a16:colId xmlns:a16="http://schemas.microsoft.com/office/drawing/2014/main" val="2152340283"/>
-                    </a:ext>
-                  </a:extLst>
-                </a:gridCol>
-                <a:gridCol w="3088058">
-                  <a:extLst>
-                    <a:ext uri="{9D8B030D-6E8A-4147-A177-3AD203B41FA5}">
-                      <a16:colId xmlns:a16="http://schemas.microsoft.com/office/drawing/2014/main" val="3109148862"/>
-                    </a:ext>
-                  </a:extLst>
-                </a:gridCol>
-                <a:gridCol w="1471242">
-                  <a:extLst>
-                    <a:ext uri="{9D8B030D-6E8A-4147-A177-3AD203B41FA5}">
-                      <a16:colId xmlns:a16="http://schemas.microsoft.com/office/drawing/2014/main" val="3877568521"/>
-                    </a:ext>
-                  </a:extLst>
-                </a:gridCol>
-                <a:gridCol w="1238092">
-                  <a:extLst>
-                    <a:ext uri="{9D8B030D-6E8A-4147-A177-3AD203B41FA5}">
-                      <a16:colId xmlns:a16="http://schemas.microsoft.com/office/drawing/2014/main" val="1017038965"/>
-                    </a:ext>
-                  </a:extLst>
-                </a:gridCol>
-                <a:gridCol w="1354667">
-                  <a:extLst>
-                    <a:ext uri="{9D8B030D-6E8A-4147-A177-3AD203B41FA5}">
-                      <a16:colId xmlns:a16="http://schemas.microsoft.com/office/drawing/2014/main" val="1534746452"/>
-                    </a:ext>
-                  </a:extLst>
-                </a:gridCol>
-                <a:gridCol w="2781615">
-                  <a:extLst>
-                    <a:ext uri="{9D8B030D-6E8A-4147-A177-3AD203B41FA5}">
-                      <a16:colId xmlns:a16="http://schemas.microsoft.com/office/drawing/2014/main" val="699516251"/>
-                    </a:ext>
-                  </a:extLst>
-                </a:gridCol>
-              </a:tblGrid>
-              <a:tr h="723648">
-                <a:tc>
-                  <a:txBody>
-                    <a:bodyPr/>
-                    <a:lstStyle/>
-                    <a:p>
-                      <a:pPr algn="ctr"/>
-                      <a:r>
-                        <a:rPr lang="en-US" sz="1600" dirty="0"/>
-                        <a:t>No.</a:t>
-                      </a:r>
-                    </a:p>
-                  </a:txBody>
-                  <a:tcPr/>
-                </a:tc>
-                <a:tc>
-                  <a:txBody>
-                    <a:bodyPr/>
-                    <a:lstStyle/>
-                    <a:p>
-                      <a:pPr algn="l"/>
-                      <a:r>
-                        <a:rPr lang="en-US" sz="1600" dirty="0"/>
-                        <a:t>Scenario Description</a:t>
-                      </a:r>
-                    </a:p>
-                  </a:txBody>
-                  <a:tcPr/>
-                </a:tc>
-                <a:tc>
-                  <a:txBody>
-                    <a:bodyPr/>
-                    <a:lstStyle/>
-                    <a:p>
-                      <a:pPr algn="ctr"/>
-                      <a:r>
-                        <a:rPr lang="en-US" sz="1600" dirty="0"/>
-                        <a:t>Critical Load Interruptions</a:t>
-                      </a:r>
-                    </a:p>
-                  </a:txBody>
-                  <a:tcPr/>
-                </a:tc>
-                <a:tc>
-                  <a:txBody>
-                    <a:bodyPr/>
-                    <a:lstStyle/>
-                    <a:p>
-                      <a:pPr algn="ctr"/>
-                      <a:r>
-                        <a:rPr lang="en-US" sz="1600" dirty="0"/>
-                        <a:t>Non Critical Load Shed Events</a:t>
-                      </a:r>
-                    </a:p>
-                  </a:txBody>
-                  <a:tcPr/>
-                </a:tc>
-                <a:tc>
-                  <a:txBody>
-                    <a:bodyPr/>
-                    <a:lstStyle/>
-                    <a:p>
-                      <a:pPr algn="ctr"/>
-                      <a:r>
-                        <a:rPr lang="en-US" sz="1600" dirty="0"/>
-                        <a:t>Avg Cost ($/kWh)</a:t>
-                      </a:r>
-                    </a:p>
-                  </a:txBody>
-                  <a:tcPr/>
-                </a:tc>
-                <a:tc>
-                  <a:txBody>
-                    <a:bodyPr/>
-                    <a:lstStyle/>
-                    <a:p>
-                      <a:pPr algn="l"/>
-                      <a:r>
-                        <a:rPr lang="en-US" sz="1600" dirty="0"/>
-                        <a:t>Notes</a:t>
-                      </a:r>
-                    </a:p>
-                  </a:txBody>
-                  <a:tcPr/>
-                </a:tc>
-                <a:extLst>
-                  <a:ext uri="{0D108BD9-81ED-4DB2-BD59-A6C34878D82A}">
-                    <a16:rowId xmlns:a16="http://schemas.microsoft.com/office/drawing/2014/main" val="3590109854"/>
-                  </a:ext>
-                </a:extLst>
-              </a:tr>
-              <a:tr h="370840">
-                <a:tc>
-                  <a:txBody>
-                    <a:bodyPr/>
-                    <a:lstStyle/>
-                    <a:p>
-                      <a:pPr algn="ctr"/>
-                      <a:r>
-                        <a:rPr lang="en-US" sz="1600" dirty="0"/>
-                        <a:t>1</a:t>
-                      </a:r>
-                    </a:p>
-                  </a:txBody>
-                  <a:tcPr/>
-                </a:tc>
-                <a:tc>
-                  <a:txBody>
-                    <a:bodyPr/>
-                    <a:lstStyle/>
-                    <a:p>
-                      <a:pPr algn="l"/>
-                      <a:r>
-                        <a:rPr lang="en-US" sz="1600" dirty="0"/>
-                        <a:t>Existing PV Plant – 5 MW</a:t>
-                      </a:r>
-                    </a:p>
-                    <a:p>
-                      <a:pPr algn="l"/>
-                      <a:r>
-                        <a:rPr lang="en-US" sz="1600" dirty="0"/>
-                        <a:t>New PV Plant – 40 MW (Year 1)</a:t>
-                      </a:r>
-                    </a:p>
-                    <a:p>
-                      <a:pPr algn="l"/>
-                      <a:r>
-                        <a:rPr lang="en-US" sz="1600" dirty="0"/>
-                        <a:t>New PV Plant – 5 MW (Year 3)</a:t>
-                      </a:r>
-                    </a:p>
-                    <a:p>
-                      <a:pPr algn="l"/>
-                      <a:r>
-                        <a:rPr lang="en-US" sz="1600" dirty="0"/>
-                        <a:t>New PV Plant – 5 MW (Year 5)</a:t>
-                      </a:r>
-                    </a:p>
-                    <a:p>
-                      <a:pPr algn="l"/>
-                      <a:r>
-                        <a:rPr lang="en-US" sz="1600" dirty="0"/>
-                        <a:t>New PV Plant – 5 MW (Year 8)</a:t>
-                      </a:r>
-                    </a:p>
-                    <a:p>
-                      <a:pPr algn="l"/>
-                      <a:r>
-                        <a:rPr lang="en-US" sz="1600" dirty="0"/>
-                        <a:t>------</a:t>
-                      </a:r>
-                    </a:p>
-                    <a:p>
-                      <a:pPr algn="l"/>
-                      <a:r>
-                        <a:rPr lang="en-US" sz="1600" dirty="0"/>
-                        <a:t>60MWh BESS (Year 1)</a:t>
-                      </a:r>
-                    </a:p>
-                    <a:p>
-                      <a:pPr algn="l"/>
-                      <a:r>
-                        <a:rPr lang="en-US" sz="1600" dirty="0"/>
-                        <a:t>5MWh (Year 3)</a:t>
-                      </a:r>
-                    </a:p>
-                    <a:p>
-                      <a:pPr algn="l"/>
-                      <a:r>
-                        <a:rPr lang="en-US" sz="1600" dirty="0"/>
-                        <a:t>10MWh (Year 5)</a:t>
-                      </a:r>
-                    </a:p>
-                    <a:p>
-                      <a:pPr algn="l"/>
-                      <a:r>
-                        <a:rPr lang="en-US" sz="1600" dirty="0"/>
-                        <a:t>10MWh (Year 8)</a:t>
-                      </a:r>
-                    </a:p>
-                    <a:p>
-                      <a:pPr algn="l"/>
-                      <a:r>
-                        <a:rPr lang="en-US" sz="1600" dirty="0"/>
-                        <a:t>10MWh ( Year 10)</a:t>
-                      </a:r>
-                    </a:p>
-                    <a:p>
-                      <a:pPr algn="l"/>
-                      <a:r>
-                        <a:rPr lang="en-US" sz="1600" dirty="0"/>
-                        <a:t>------</a:t>
-                      </a:r>
-                    </a:p>
-                    <a:p>
-                      <a:pPr algn="l"/>
-                      <a:r>
-                        <a:rPr lang="en-US" sz="1600" dirty="0"/>
-                        <a:t>6 x 1.5MW HSD from Year 1</a:t>
-                      </a:r>
-                    </a:p>
-                  </a:txBody>
-                  <a:tcPr/>
-                </a:tc>
-                <a:tc>
-                  <a:txBody>
-                    <a:bodyPr/>
-                    <a:lstStyle/>
-                    <a:p>
-                      <a:pPr algn="ctr"/>
-                      <a:r>
-                        <a:rPr lang="en-US" sz="1600" dirty="0"/>
-                        <a:t>0-1</a:t>
-                      </a:r>
-                    </a:p>
-                  </a:txBody>
-                  <a:tcPr/>
-                </a:tc>
-                <a:tc>
-                  <a:txBody>
-                    <a:bodyPr/>
-                    <a:lstStyle/>
-                    <a:p>
-                      <a:pPr algn="ctr"/>
-                      <a:r>
-                        <a:rPr lang="en-US" sz="1600" dirty="0"/>
-                        <a:t>52</a:t>
-                      </a:r>
-                    </a:p>
-                  </a:txBody>
-                  <a:tcPr/>
-                </a:tc>
-                <a:tc>
-                  <a:txBody>
-                    <a:bodyPr/>
-                    <a:lstStyle/>
-                    <a:p>
-                      <a:pPr algn="ctr"/>
-                      <a:r>
-                        <a:rPr lang="en-US" sz="1600" dirty="0"/>
-                        <a:t>0.20</a:t>
-                      </a:r>
-                    </a:p>
-                  </a:txBody>
-                  <a:tcPr/>
-                </a:tc>
-                <a:tc>
-                  <a:txBody>
-                    <a:bodyPr/>
-                    <a:lstStyle/>
-                    <a:p>
-                      <a:pPr algn="l"/>
-                      <a:r>
-                        <a:rPr lang="en-US" sz="1600" dirty="0"/>
-                        <a:t>Staged addition of PPA sources keeps the average unit low.</a:t>
-                      </a:r>
-                    </a:p>
-                  </a:txBody>
-                  <a:tcPr/>
-                </a:tc>
-                <a:extLst>
-                  <a:ext uri="{0D108BD9-81ED-4DB2-BD59-A6C34878D82A}">
-                    <a16:rowId xmlns:a16="http://schemas.microsoft.com/office/drawing/2014/main" val="3594884084"/>
-                  </a:ext>
-                </a:extLst>
-              </a:tr>
-            </a:tbl>
-          </a:graphicData>
-        </a:graphic>
-      </p:graphicFrame>
+          <p:cNvSpPr txBox="1">
+            <a:spLocks/>
+          </p:cNvSpPr>
+          <p:nvPr/>
+        </p:nvSpPr>
+        <p:spPr>
+          <a:xfrm>
+            <a:off x="966788" y="1175056"/>
+            <a:ext cx="10387012" cy="5593492"/>
+          </a:xfrm>
+          <a:prstGeom prst="rect">
+            <a:avLst/>
+          </a:prstGeom>
+        </p:spPr>
+        <p:txBody>
+          <a:bodyPr vert="horz" lIns="91440" tIns="45720" rIns="91440" bIns="45720" rtlCol="0">
+            <a:normAutofit/>
+          </a:bodyPr>
+          <a:lstStyle>
+            <a:lvl1pPr marL="0" indent="0" algn="ctr" defTabSz="914400" rtl="0" eaLnBrk="1" latinLnBrk="0" hangingPunct="1">
+              <a:lnSpc>
+                <a:spcPct val="90000"/>
+              </a:lnSpc>
+              <a:spcBef>
+                <a:spcPts val="1000"/>
+              </a:spcBef>
+              <a:buFont typeface="Arial" panose="020B0604020202020204" pitchFamily="34" charset="0"/>
+              <a:buNone/>
+              <a:defRPr sz="2400" kern="1200">
+                <a:solidFill>
+                  <a:schemeClr val="tx1"/>
+                </a:solidFill>
+                <a:latin typeface="+mn-lt"/>
+                <a:ea typeface="+mn-ea"/>
+                <a:cs typeface="+mn-cs"/>
+              </a:defRPr>
+            </a:lvl1pPr>
+            <a:lvl2pPr marL="457200" indent="0" algn="ctr" defTabSz="914400" rtl="0" eaLnBrk="1" latinLnBrk="0" hangingPunct="1">
+              <a:lnSpc>
+                <a:spcPct val="90000"/>
+              </a:lnSpc>
+              <a:spcBef>
+                <a:spcPts val="500"/>
+              </a:spcBef>
+              <a:buFont typeface="Arial" panose="020B0604020202020204" pitchFamily="34" charset="0"/>
+              <a:buNone/>
+              <a:defRPr sz="2000" kern="1200">
+                <a:solidFill>
+                  <a:schemeClr val="tx1"/>
+                </a:solidFill>
+                <a:latin typeface="+mn-lt"/>
+                <a:ea typeface="+mn-ea"/>
+                <a:cs typeface="+mn-cs"/>
+              </a:defRPr>
+            </a:lvl2pPr>
+            <a:lvl3pPr marL="914400" indent="0" algn="ctr" defTabSz="914400" rtl="0" eaLnBrk="1" latinLnBrk="0" hangingPunct="1">
+              <a:lnSpc>
+                <a:spcPct val="90000"/>
+              </a:lnSpc>
+              <a:spcBef>
+                <a:spcPts val="500"/>
+              </a:spcBef>
+              <a:buFont typeface="Arial" panose="020B0604020202020204" pitchFamily="34" charset="0"/>
+              <a:buNone/>
+              <a:defRPr sz="1800" kern="1200">
+                <a:solidFill>
+                  <a:schemeClr val="tx1"/>
+                </a:solidFill>
+                <a:latin typeface="+mn-lt"/>
+                <a:ea typeface="+mn-ea"/>
+                <a:cs typeface="+mn-cs"/>
+              </a:defRPr>
+            </a:lvl3pPr>
+            <a:lvl4pPr marL="1371600" indent="0" algn="ctr" defTabSz="914400" rtl="0" eaLnBrk="1" latinLnBrk="0" hangingPunct="1">
+              <a:lnSpc>
+                <a:spcPct val="90000"/>
+              </a:lnSpc>
+              <a:spcBef>
+                <a:spcPts val="500"/>
+              </a:spcBef>
+              <a:buFont typeface="Arial" panose="020B0604020202020204" pitchFamily="34" charset="0"/>
+              <a:buNone/>
+              <a:defRPr sz="1600" kern="1200">
+                <a:solidFill>
+                  <a:schemeClr val="tx1"/>
+                </a:solidFill>
+                <a:latin typeface="+mn-lt"/>
+                <a:ea typeface="+mn-ea"/>
+                <a:cs typeface="+mn-cs"/>
+              </a:defRPr>
+            </a:lvl4pPr>
+            <a:lvl5pPr marL="1828800" indent="0" algn="ctr" defTabSz="914400" rtl="0" eaLnBrk="1" latinLnBrk="0" hangingPunct="1">
+              <a:lnSpc>
+                <a:spcPct val="90000"/>
+              </a:lnSpc>
+              <a:spcBef>
+                <a:spcPts val="500"/>
+              </a:spcBef>
+              <a:buFont typeface="Arial" panose="020B0604020202020204" pitchFamily="34" charset="0"/>
+              <a:buNone/>
+              <a:defRPr sz="1600" kern="1200">
+                <a:solidFill>
+                  <a:schemeClr val="tx1"/>
+                </a:solidFill>
+                <a:latin typeface="+mn-lt"/>
+                <a:ea typeface="+mn-ea"/>
+                <a:cs typeface="+mn-cs"/>
+              </a:defRPr>
+            </a:lvl5pPr>
+            <a:lvl6pPr marL="2286000" indent="0" algn="ctr" defTabSz="914400" rtl="0" eaLnBrk="1" latinLnBrk="0" hangingPunct="1">
+              <a:lnSpc>
+                <a:spcPct val="90000"/>
+              </a:lnSpc>
+              <a:spcBef>
+                <a:spcPts val="500"/>
+              </a:spcBef>
+              <a:buFont typeface="Arial" panose="020B0604020202020204" pitchFamily="34" charset="0"/>
+              <a:buNone/>
+              <a:defRPr sz="1600" kern="1200">
+                <a:solidFill>
+                  <a:schemeClr val="tx1"/>
+                </a:solidFill>
+                <a:latin typeface="+mn-lt"/>
+                <a:ea typeface="+mn-ea"/>
+                <a:cs typeface="+mn-cs"/>
+              </a:defRPr>
+            </a:lvl6pPr>
+            <a:lvl7pPr marL="2743200" indent="0" algn="ctr" defTabSz="914400" rtl="0" eaLnBrk="1" latinLnBrk="0" hangingPunct="1">
+              <a:lnSpc>
+                <a:spcPct val="90000"/>
+              </a:lnSpc>
+              <a:spcBef>
+                <a:spcPts val="500"/>
+              </a:spcBef>
+              <a:buFont typeface="Arial" panose="020B0604020202020204" pitchFamily="34" charset="0"/>
+              <a:buNone/>
+              <a:defRPr sz="1600" kern="1200">
+                <a:solidFill>
+                  <a:schemeClr val="tx1"/>
+                </a:solidFill>
+                <a:latin typeface="+mn-lt"/>
+                <a:ea typeface="+mn-ea"/>
+                <a:cs typeface="+mn-cs"/>
+              </a:defRPr>
+            </a:lvl7pPr>
+            <a:lvl8pPr marL="3200400" indent="0" algn="ctr" defTabSz="914400" rtl="0" eaLnBrk="1" latinLnBrk="0" hangingPunct="1">
+              <a:lnSpc>
+                <a:spcPct val="90000"/>
+              </a:lnSpc>
+              <a:spcBef>
+                <a:spcPts val="500"/>
+              </a:spcBef>
+              <a:buFont typeface="Arial" panose="020B0604020202020204" pitchFamily="34" charset="0"/>
+              <a:buNone/>
+              <a:defRPr sz="1600" kern="1200">
+                <a:solidFill>
+                  <a:schemeClr val="tx1"/>
+                </a:solidFill>
+                <a:latin typeface="+mn-lt"/>
+                <a:ea typeface="+mn-ea"/>
+                <a:cs typeface="+mn-cs"/>
+              </a:defRPr>
+            </a:lvl8pPr>
+            <a:lvl9pPr marL="3657600" indent="0" algn="ctr" defTabSz="914400" rtl="0" eaLnBrk="1" latinLnBrk="0" hangingPunct="1">
+              <a:lnSpc>
+                <a:spcPct val="90000"/>
+              </a:lnSpc>
+              <a:spcBef>
+                <a:spcPts val="500"/>
+              </a:spcBef>
+              <a:buFont typeface="Arial" panose="020B0604020202020204" pitchFamily="34" charset="0"/>
+              <a:buNone/>
+              <a:defRPr sz="1600" kern="1200">
+                <a:solidFill>
+                  <a:schemeClr val="tx1"/>
+                </a:solidFill>
+                <a:latin typeface="+mn-lt"/>
+                <a:ea typeface="+mn-ea"/>
+                <a:cs typeface="+mn-cs"/>
+              </a:defRPr>
+            </a:lvl9pPr>
+          </a:lstStyle>
+          <a:p>
+            <a:pPr algn="l">
+              <a:lnSpc>
+                <a:spcPct val="100000"/>
+              </a:lnSpc>
+              <a:spcBef>
+                <a:spcPts val="400"/>
+              </a:spcBef>
+              <a:spcAft>
+                <a:spcPts val="200"/>
+              </a:spcAft>
+            </a:pPr>
+            <a:r>
+              <a:rPr lang="en-US" sz="2800" b="1" dirty="0">
+                <a:solidFill>
+                  <a:schemeClr val="tx1">
+                    <a:lumMod val="75000"/>
+                    <a:lumOff val="25000"/>
+                  </a:schemeClr>
+                </a:solidFill>
+              </a:rPr>
+              <a:t>1. Scenario 1</a:t>
+            </a:r>
+          </a:p>
+          <a:p>
+            <a:pPr marL="800100" lvl="1" indent="-342900" algn="l">
+              <a:lnSpc>
+                <a:spcPct val="100000"/>
+              </a:lnSpc>
+              <a:spcBef>
+                <a:spcPts val="400"/>
+              </a:spcBef>
+              <a:spcAft>
+                <a:spcPts val="200"/>
+              </a:spcAft>
+              <a:buFont typeface="Arial" panose="020B0604020202020204" pitchFamily="34" charset="0"/>
+              <a:buChar char="•"/>
+            </a:pPr>
+            <a:r>
+              <a:rPr lang="en-US" sz="2400" dirty="0">
+                <a:solidFill>
+                  <a:schemeClr val="tx1">
+                    <a:lumMod val="75000"/>
+                    <a:lumOff val="25000"/>
+                  </a:schemeClr>
+                </a:solidFill>
+              </a:rPr>
+              <a:t>Retains existing 5MW Solar PV PPA, 6 x 1.5 MW Diesel Generators</a:t>
+            </a:r>
+          </a:p>
+          <a:p>
+            <a:pPr marL="800100" lvl="1" indent="-342900" algn="l">
+              <a:lnSpc>
+                <a:spcPct val="100000"/>
+              </a:lnSpc>
+              <a:spcBef>
+                <a:spcPts val="400"/>
+              </a:spcBef>
+              <a:spcAft>
+                <a:spcPts val="200"/>
+              </a:spcAft>
+              <a:buFont typeface="Arial" panose="020B0604020202020204" pitchFamily="34" charset="0"/>
+              <a:buChar char="•"/>
+            </a:pPr>
+            <a:r>
+              <a:rPr lang="en-US" sz="2400" dirty="0">
+                <a:solidFill>
+                  <a:schemeClr val="tx1">
+                    <a:lumMod val="75000"/>
+                    <a:lumOff val="25000"/>
+                  </a:schemeClr>
+                </a:solidFill>
+              </a:rPr>
+              <a:t>Add 35MW Solar PV + 130 MWh BESS as Build-Own-Operate PPA on take-or-pay pricing. This config which has been recommended by a vendor and priced $0.13/ kWh for a 15-year term.</a:t>
+            </a:r>
+            <a:endParaRPr lang="en-US" dirty="0">
+              <a:solidFill>
+                <a:schemeClr val="tx1">
+                  <a:lumMod val="75000"/>
+                  <a:lumOff val="25000"/>
+                </a:schemeClr>
+              </a:solidFill>
+            </a:endParaRPr>
+          </a:p>
+          <a:p>
+            <a:pPr lvl="1" algn="l">
+              <a:lnSpc>
+                <a:spcPct val="100000"/>
+              </a:lnSpc>
+              <a:spcBef>
+                <a:spcPts val="400"/>
+              </a:spcBef>
+              <a:spcAft>
+                <a:spcPts val="200"/>
+              </a:spcAft>
+            </a:pPr>
+            <a:endParaRPr lang="en-US" sz="600" dirty="0">
+              <a:solidFill>
+                <a:schemeClr val="tx1">
+                  <a:lumMod val="75000"/>
+                  <a:lumOff val="25000"/>
+                </a:schemeClr>
+              </a:solidFill>
+            </a:endParaRPr>
+          </a:p>
+          <a:p>
+            <a:pPr algn="l">
+              <a:lnSpc>
+                <a:spcPct val="100000"/>
+              </a:lnSpc>
+              <a:spcBef>
+                <a:spcPts val="400"/>
+              </a:spcBef>
+              <a:spcAft>
+                <a:spcPts val="200"/>
+              </a:spcAft>
+            </a:pPr>
+            <a:r>
+              <a:rPr lang="en-US" sz="2800" dirty="0">
+                <a:solidFill>
+                  <a:schemeClr val="tx1">
+                    <a:lumMod val="75000"/>
+                    <a:lumOff val="25000"/>
+                  </a:schemeClr>
+                </a:solidFill>
+              </a:rPr>
+              <a:t>2. </a:t>
+            </a:r>
+            <a:r>
+              <a:rPr lang="en-US" sz="2800" b="1" dirty="0">
+                <a:solidFill>
+                  <a:schemeClr val="tx1">
+                    <a:lumMod val="75000"/>
+                    <a:lumOff val="25000"/>
+                  </a:schemeClr>
+                </a:solidFill>
+              </a:rPr>
+              <a:t>Scenario 2</a:t>
+            </a:r>
+            <a:endParaRPr lang="en-US" sz="2800" dirty="0">
+              <a:solidFill>
+                <a:schemeClr val="tx1">
+                  <a:lumMod val="75000"/>
+                  <a:lumOff val="25000"/>
+                </a:schemeClr>
+              </a:solidFill>
+            </a:endParaRPr>
+          </a:p>
+          <a:p>
+            <a:pPr marL="800100" lvl="1" indent="-342900" algn="l">
+              <a:lnSpc>
+                <a:spcPct val="100000"/>
+              </a:lnSpc>
+              <a:spcBef>
+                <a:spcPts val="400"/>
+              </a:spcBef>
+              <a:spcAft>
+                <a:spcPts val="200"/>
+              </a:spcAft>
+              <a:buFont typeface="Arial" panose="020B0604020202020204" pitchFamily="34" charset="0"/>
+              <a:buChar char="•"/>
+            </a:pPr>
+            <a:r>
+              <a:rPr lang="en-US" sz="2400" dirty="0">
+                <a:solidFill>
+                  <a:schemeClr val="tx1">
+                    <a:lumMod val="75000"/>
+                    <a:lumOff val="25000"/>
+                  </a:schemeClr>
+                </a:solidFill>
+              </a:rPr>
+              <a:t>Retains existing 5MW Solar PV PPA, 6 x 1.5 MW Diesel Generators</a:t>
+            </a:r>
+          </a:p>
+          <a:p>
+            <a:pPr marL="800100" lvl="1" indent="-342900" algn="l">
+              <a:lnSpc>
+                <a:spcPct val="100000"/>
+              </a:lnSpc>
+              <a:spcBef>
+                <a:spcPts val="400"/>
+              </a:spcBef>
+              <a:spcAft>
+                <a:spcPts val="200"/>
+              </a:spcAft>
+              <a:buFont typeface="Arial" panose="020B0604020202020204" pitchFamily="34" charset="0"/>
+              <a:buChar char="•"/>
+            </a:pPr>
+            <a:r>
+              <a:rPr lang="en-US" sz="2400" dirty="0">
+                <a:solidFill>
+                  <a:schemeClr val="tx1">
+                    <a:lumMod val="75000"/>
+                    <a:lumOff val="25000"/>
+                  </a:schemeClr>
+                </a:solidFill>
+              </a:rPr>
+              <a:t>Corrects problems with Scenario 1’s new PV + BESS PPA configuration.</a:t>
+            </a:r>
+            <a:endParaRPr lang="en-US" sz="2000" dirty="0">
+              <a:solidFill>
+                <a:schemeClr val="tx1">
+                  <a:lumMod val="75000"/>
+                  <a:lumOff val="25000"/>
+                </a:schemeClr>
+              </a:solidFill>
+            </a:endParaRPr>
+          </a:p>
+          <a:p>
+            <a:pPr lvl="1" algn="l">
+              <a:lnSpc>
+                <a:spcPct val="100000"/>
+              </a:lnSpc>
+              <a:spcBef>
+                <a:spcPts val="400"/>
+              </a:spcBef>
+              <a:spcAft>
+                <a:spcPts val="200"/>
+              </a:spcAft>
+            </a:pPr>
+            <a:endParaRPr lang="en-US" sz="600" dirty="0"/>
+          </a:p>
+          <a:p>
+            <a:pPr algn="l">
+              <a:lnSpc>
+                <a:spcPct val="100000"/>
+              </a:lnSpc>
+              <a:spcBef>
+                <a:spcPts val="400"/>
+              </a:spcBef>
+              <a:spcAft>
+                <a:spcPts val="200"/>
+              </a:spcAft>
+            </a:pPr>
+            <a:r>
+              <a:rPr lang="en-US" sz="2800" dirty="0">
+                <a:solidFill>
+                  <a:schemeClr val="tx1">
+                    <a:lumMod val="75000"/>
+                    <a:lumOff val="25000"/>
+                  </a:schemeClr>
+                </a:solidFill>
+              </a:rPr>
+              <a:t>3. </a:t>
+            </a:r>
+            <a:r>
+              <a:rPr lang="en-US" sz="2800" b="1" dirty="0">
+                <a:solidFill>
+                  <a:schemeClr val="tx1">
+                    <a:lumMod val="75000"/>
+                    <a:lumOff val="25000"/>
+                  </a:schemeClr>
+                </a:solidFill>
+              </a:rPr>
+              <a:t>Scenario 3</a:t>
+            </a:r>
+            <a:endParaRPr lang="en-US" sz="2800" dirty="0">
+              <a:solidFill>
+                <a:schemeClr val="tx1">
+                  <a:lumMod val="75000"/>
+                  <a:lumOff val="25000"/>
+                </a:schemeClr>
+              </a:solidFill>
+            </a:endParaRPr>
+          </a:p>
+          <a:p>
+            <a:pPr marL="800100" lvl="1" indent="-342900" algn="l">
+              <a:lnSpc>
+                <a:spcPct val="100000"/>
+              </a:lnSpc>
+              <a:spcBef>
+                <a:spcPts val="400"/>
+              </a:spcBef>
+              <a:spcAft>
+                <a:spcPts val="200"/>
+              </a:spcAft>
+              <a:buFont typeface="Arial" panose="020B0604020202020204" pitchFamily="34" charset="0"/>
+              <a:buChar char="•"/>
+            </a:pPr>
+            <a:r>
+              <a:rPr lang="en-US" sz="2400" dirty="0">
+                <a:solidFill>
+                  <a:schemeClr val="tx1">
+                    <a:lumMod val="75000"/>
+                    <a:lumOff val="25000"/>
+                  </a:schemeClr>
+                </a:solidFill>
+              </a:rPr>
+              <a:t>Retains existing 5MW Solar PV PPA, 6 x 1.5 MW Diesel Generators</a:t>
+            </a:r>
+          </a:p>
+          <a:p>
+            <a:pPr marL="800100" lvl="1" indent="-342900" algn="l">
+              <a:lnSpc>
+                <a:spcPct val="100000"/>
+              </a:lnSpc>
+              <a:spcBef>
+                <a:spcPts val="400"/>
+              </a:spcBef>
+              <a:spcAft>
+                <a:spcPts val="200"/>
+              </a:spcAft>
+              <a:buFont typeface="Arial" panose="020B0604020202020204" pitchFamily="34" charset="0"/>
+              <a:buChar char="•"/>
+            </a:pPr>
+            <a:r>
+              <a:rPr lang="en-US" sz="2400" dirty="0">
+                <a:solidFill>
+                  <a:schemeClr val="tx1">
+                    <a:lumMod val="75000"/>
+                    <a:lumOff val="25000"/>
+                  </a:schemeClr>
+                </a:solidFill>
+              </a:rPr>
+              <a:t>Provides a phased installation of new PV + BESS PPA to optimize costs</a:t>
+            </a:r>
+            <a:endParaRPr lang="en-US" sz="2400" dirty="0"/>
+          </a:p>
+          <a:p>
+            <a:pPr lvl="1" algn="l"/>
+            <a:endParaRPr lang="en-US" sz="2400" dirty="0"/>
+          </a:p>
+        </p:txBody>
+      </p:sp>
     </p:spTree>
   </p:cSld>
   <p:clrMapOvr>
@@ -26953,8 +27444,8 @@
         </p:nvSpPr>
         <p:spPr>
           <a:xfrm>
-            <a:off x="263176" y="485499"/>
-            <a:ext cx="7273250" cy="646331"/>
+            <a:off x="618776" y="358499"/>
+            <a:ext cx="6521612" cy="646331"/>
           </a:xfrm>
           <a:prstGeom prst="rect">
             <a:avLst/>
@@ -26982,17 +27473,17 @@
                 </a:effectLst>
                 <a:latin typeface="+mj-lt"/>
               </a:rPr>
-              <a:t>Scenario 1: Summary</a:t>
+              <a:t>Summarized Modeling Outcomes</a:t>
             </a:r>
           </a:p>
         </p:txBody>
       </p:sp>
       <p:pic>
         <p:nvPicPr>
-          <p:cNvPr id="5" name="Picture 4">
+          <p:cNvPr id="3" name="Picture 2">
             <a:extLst>
               <a:ext uri="{FF2B5EF4-FFF2-40B4-BE49-F238E27FC236}">
-                <a16:creationId xmlns:a16="http://schemas.microsoft.com/office/drawing/2014/main" id="{071C777D-64DF-1C7B-77A1-29F8272DE625}"/>
+                <a16:creationId xmlns:a16="http://schemas.microsoft.com/office/drawing/2014/main" id="{D62E7AB9-BCC4-8146-F8F8-DA41017F9A25}"/>
               </a:ext>
             </a:extLst>
           </p:cNvPr>
@@ -27009,8 +27500,8 @@
         </p:blipFill>
         <p:spPr>
           <a:xfrm>
-            <a:off x="1935162" y="1436745"/>
-            <a:ext cx="8112918" cy="4265555"/>
+            <a:off x="618776" y="1290637"/>
+            <a:ext cx="10835452" cy="3878263"/>
           </a:xfrm>
           <a:prstGeom prst="rect">
             <a:avLst/>
@@ -27020,7 +27511,7 @@
     </p:spTree>
     <p:extLst>
       <p:ext uri="{BB962C8B-B14F-4D97-AF65-F5344CB8AC3E}">
-        <p14:creationId xmlns:p14="http://schemas.microsoft.com/office/powerpoint/2010/main" val="2152358598"/>
+        <p14:creationId xmlns:p14="http://schemas.microsoft.com/office/powerpoint/2010/main" val="2939187762"/>
       </p:ext>
     </p:extLst>
   </p:cSld>
@@ -30130,6 +30621,2524 @@
         </p:nvSpPr>
         <p:spPr>
           <a:xfrm>
+            <a:off x="618775" y="358499"/>
+            <a:ext cx="9910271" cy="646331"/>
+          </a:xfrm>
+          <a:prstGeom prst="rect">
+            <a:avLst/>
+          </a:prstGeom>
+          <a:noFill/>
+        </p:spPr>
+        <p:txBody>
+          <a:bodyPr wrap="square" lIns="91440" tIns="45720" rIns="91440" bIns="45720">
+            <a:spAutoFit/>
+          </a:bodyPr>
+          <a:lstStyle/>
+          <a:p>
+            <a:r>
+              <a:rPr lang="en-US" sz="3600" b="1" cap="none" spc="0" dirty="0">
+                <a:ln w="0"/>
+                <a:solidFill>
+                  <a:srgbClr val="44546A"/>
+                </a:solidFill>
+                <a:effectLst>
+                  <a:outerShdw blurRad="38100" dist="19050" dir="2700000" algn="tl" rotWithShape="0">
+                    <a:schemeClr val="dk1">
+                      <a:alpha val="40000"/>
+                    </a:schemeClr>
+                  </a:outerShdw>
+                </a:effectLst>
+                <a:latin typeface="+mj-lt"/>
+              </a:rPr>
+              <a:t>Summarized Modeling Outcomes </a:t>
+            </a:r>
+            <a:r>
+              <a:rPr lang="en-US" sz="3200" dirty="0">
+                <a:solidFill>
+                  <a:srgbClr val="44546A"/>
+                </a:solidFill>
+              </a:rPr>
+              <a:t>(continued)</a:t>
+            </a:r>
+            <a:r>
+              <a:rPr lang="en-US" sz="3600" b="1" cap="none" spc="0" dirty="0">
+                <a:ln w="0"/>
+                <a:solidFill>
+                  <a:srgbClr val="44546A"/>
+                </a:solidFill>
+                <a:effectLst>
+                  <a:outerShdw blurRad="38100" dist="19050" dir="2700000" algn="tl" rotWithShape="0">
+                    <a:schemeClr val="dk1">
+                      <a:alpha val="40000"/>
+                    </a:schemeClr>
+                  </a:outerShdw>
+                </a:effectLst>
+                <a:latin typeface="+mj-lt"/>
+              </a:rPr>
+              <a:t> </a:t>
+            </a:r>
+          </a:p>
+        </p:txBody>
+      </p:sp>
+      <p:pic>
+        <p:nvPicPr>
+          <p:cNvPr id="3" name="Picture 2">
+            <a:extLst>
+              <a:ext uri="{FF2B5EF4-FFF2-40B4-BE49-F238E27FC236}">
+                <a16:creationId xmlns:a16="http://schemas.microsoft.com/office/drawing/2014/main" id="{13D591BE-96A9-DD29-1C59-93BD378658E1}"/>
+              </a:ext>
+            </a:extLst>
+          </p:cNvPr>
+          <p:cNvPicPr>
+            <a:picLocks noChangeAspect="1"/>
+          </p:cNvPicPr>
+          <p:nvPr/>
+        </p:nvPicPr>
+        <p:blipFill>
+          <a:blip r:embed="rId3"/>
+          <a:stretch>
+            <a:fillRect/>
+          </a:stretch>
+        </p:blipFill>
+        <p:spPr>
+          <a:xfrm>
+            <a:off x="618776" y="1409980"/>
+            <a:ext cx="11279978" cy="3197879"/>
+          </a:xfrm>
+          <a:prstGeom prst="rect">
+            <a:avLst/>
+          </a:prstGeom>
+        </p:spPr>
+      </p:pic>
+    </p:spTree>
+    <p:extLst>
+      <p:ext uri="{BB962C8B-B14F-4D97-AF65-F5344CB8AC3E}">
+        <p14:creationId xmlns:p14="http://schemas.microsoft.com/office/powerpoint/2010/main" val="1147185027"/>
+      </p:ext>
+    </p:extLst>
+  </p:cSld>
+  <p:clrMapOvr>
+    <a:masterClrMapping/>
+  </p:clrMapOvr>
+</p:sld>
+</file>
+
+<file path=ppt/slides/slide21.xml><?xml version="1.0" encoding="utf-8"?>
+<p:sld xmlns:a="http://schemas.openxmlformats.org/drawingml/2006/main" xmlns:r="http://schemas.openxmlformats.org/officeDocument/2006/relationships" xmlns:p="http://schemas.openxmlformats.org/presentationml/2006/main">
+  <p:cSld>
+    <p:spTree>
+      <p:nvGrpSpPr>
+        <p:cNvPr id="1" name=""/>
+        <p:cNvGrpSpPr/>
+        <p:nvPr/>
+      </p:nvGrpSpPr>
+      <p:grpSpPr>
+        <a:xfrm>
+          <a:off x="0" y="0"/>
+          <a:ext cx="0" cy="0"/>
+          <a:chOff x="0" y="0"/>
+          <a:chExt cx="0" cy="0"/>
+        </a:xfrm>
+      </p:grpSpPr>
+      <p:pic>
+        <p:nvPicPr>
+          <p:cNvPr id="4" name="Picture 3">
+            <a:extLst>
+              <a:ext uri="{FF2B5EF4-FFF2-40B4-BE49-F238E27FC236}">
+                <a16:creationId xmlns:a16="http://schemas.microsoft.com/office/drawing/2014/main" id="{61993BB8-EDDB-2C7D-C93C-BDF74C9C8669}"/>
+              </a:ext>
+            </a:extLst>
+          </p:cNvPr>
+          <p:cNvPicPr>
+            <a:picLocks noChangeAspect="1"/>
+          </p:cNvPicPr>
+          <p:nvPr/>
+        </p:nvPicPr>
+        <p:blipFill>
+          <a:blip r:embed="rId3"/>
+          <a:stretch>
+            <a:fillRect/>
+          </a:stretch>
+        </p:blipFill>
+        <p:spPr>
+          <a:xfrm>
+            <a:off x="618776" y="1250577"/>
+            <a:ext cx="11061847" cy="3536576"/>
+          </a:xfrm>
+          <a:prstGeom prst="rect">
+            <a:avLst/>
+          </a:prstGeom>
+        </p:spPr>
+      </p:pic>
+      <p:sp>
+        <p:nvSpPr>
+          <p:cNvPr id="6" name="Rectangle 5">
+            <a:extLst>
+              <a:ext uri="{FF2B5EF4-FFF2-40B4-BE49-F238E27FC236}">
+                <a16:creationId xmlns:a16="http://schemas.microsoft.com/office/drawing/2014/main" id="{56911D82-EBC5-9488-9F20-617C1C5CF7DF}"/>
+              </a:ext>
+            </a:extLst>
+          </p:cNvPr>
+          <p:cNvSpPr/>
+          <p:nvPr/>
+        </p:nvSpPr>
+        <p:spPr>
+          <a:xfrm>
+            <a:off x="618775" y="358499"/>
+            <a:ext cx="9910271" cy="646331"/>
+          </a:xfrm>
+          <a:prstGeom prst="rect">
+            <a:avLst/>
+          </a:prstGeom>
+          <a:noFill/>
+        </p:spPr>
+        <p:txBody>
+          <a:bodyPr wrap="square" lIns="91440" tIns="45720" rIns="91440" bIns="45720">
+            <a:spAutoFit/>
+          </a:bodyPr>
+          <a:lstStyle/>
+          <a:p>
+            <a:r>
+              <a:rPr lang="en-US" sz="3600" b="1" cap="none" spc="0" dirty="0">
+                <a:ln w="0"/>
+                <a:solidFill>
+                  <a:srgbClr val="44546A"/>
+                </a:solidFill>
+                <a:effectLst>
+                  <a:outerShdw blurRad="38100" dist="19050" dir="2700000" algn="tl" rotWithShape="0">
+                    <a:schemeClr val="dk1">
+                      <a:alpha val="40000"/>
+                    </a:schemeClr>
+                  </a:outerShdw>
+                </a:effectLst>
+                <a:latin typeface="+mj-lt"/>
+              </a:rPr>
+              <a:t>Summarized Modeling Outcomes </a:t>
+            </a:r>
+            <a:r>
+              <a:rPr lang="en-US" sz="3200" dirty="0">
+                <a:solidFill>
+                  <a:srgbClr val="44546A"/>
+                </a:solidFill>
+              </a:rPr>
+              <a:t>(continued)</a:t>
+            </a:r>
+            <a:r>
+              <a:rPr lang="en-US" sz="3600" b="1" cap="none" spc="0" dirty="0">
+                <a:ln w="0"/>
+                <a:solidFill>
+                  <a:srgbClr val="44546A"/>
+                </a:solidFill>
+                <a:effectLst>
+                  <a:outerShdw blurRad="38100" dist="19050" dir="2700000" algn="tl" rotWithShape="0">
+                    <a:schemeClr val="dk1">
+                      <a:alpha val="40000"/>
+                    </a:schemeClr>
+                  </a:outerShdw>
+                </a:effectLst>
+                <a:latin typeface="+mj-lt"/>
+              </a:rPr>
+              <a:t> </a:t>
+            </a:r>
+          </a:p>
+        </p:txBody>
+      </p:sp>
+    </p:spTree>
+    <p:extLst>
+      <p:ext uri="{BB962C8B-B14F-4D97-AF65-F5344CB8AC3E}">
+        <p14:creationId xmlns:p14="http://schemas.microsoft.com/office/powerpoint/2010/main" val="3570588581"/>
+      </p:ext>
+    </p:extLst>
+  </p:cSld>
+  <p:clrMapOvr>
+    <a:masterClrMapping/>
+  </p:clrMapOvr>
+</p:sld>
+</file>
+
+<file path=ppt/slides/slide22.xml><?xml version="1.0" encoding="utf-8"?>
+<p:sld xmlns:a="http://schemas.openxmlformats.org/drawingml/2006/main" xmlns:r="http://schemas.openxmlformats.org/officeDocument/2006/relationships" xmlns:p="http://schemas.openxmlformats.org/presentationml/2006/main">
+  <p:cSld>
+    <p:spTree>
+      <p:nvGrpSpPr>
+        <p:cNvPr id="1" name=""/>
+        <p:cNvGrpSpPr/>
+        <p:nvPr/>
+      </p:nvGrpSpPr>
+      <p:grpSpPr>
+        <a:xfrm>
+          <a:off x="0" y="0"/>
+          <a:ext cx="0" cy="0"/>
+          <a:chOff x="0" y="0"/>
+          <a:chExt cx="0" cy="0"/>
+        </a:xfrm>
+      </p:grpSpPr>
+      <p:sp>
+        <p:nvSpPr>
+          <p:cNvPr id="8" name="Rectangle 7">
+            <a:extLst>
+              <a:ext uri="{FF2B5EF4-FFF2-40B4-BE49-F238E27FC236}">
+                <a16:creationId xmlns:a16="http://schemas.microsoft.com/office/drawing/2014/main" id="{3B19791E-7559-E149-CC7A-4A3B0F837C0C}"/>
+              </a:ext>
+            </a:extLst>
+          </p:cNvPr>
+          <p:cNvSpPr/>
+          <p:nvPr/>
+        </p:nvSpPr>
+        <p:spPr>
+          <a:xfrm>
+            <a:off x="263176" y="485499"/>
+            <a:ext cx="7273250" cy="646331"/>
+          </a:xfrm>
+          <a:prstGeom prst="rect">
+            <a:avLst/>
+          </a:prstGeom>
+          <a:noFill/>
+        </p:spPr>
+        <p:txBody>
+          <a:bodyPr wrap="square" lIns="91440" tIns="45720" rIns="91440" bIns="45720">
+            <a:spAutoFit/>
+          </a:bodyPr>
+          <a:lstStyle/>
+          <a:p>
+            <a:r>
+              <a:rPr lang="en-US" sz="3600" b="1" cap="none" spc="0" dirty="0">
+                <a:ln w="0"/>
+                <a:solidFill>
+                  <a:srgbClr val="44546A"/>
+                </a:solidFill>
+                <a:effectLst>
+                  <a:outerShdw blurRad="38100" dist="19050" dir="2700000" algn="tl" rotWithShape="0">
+                    <a:schemeClr val="dk1">
+                      <a:alpha val="40000"/>
+                    </a:schemeClr>
+                  </a:outerShdw>
+                </a:effectLst>
+                <a:latin typeface="+mj-lt"/>
+              </a:rPr>
+              <a:t>Scenario 1: Configuration</a:t>
+            </a:r>
+          </a:p>
+        </p:txBody>
+      </p:sp>
+      <p:graphicFrame>
+        <p:nvGraphicFramePr>
+          <p:cNvPr id="14" name="Table 13">
+            <a:extLst>
+              <a:ext uri="{FF2B5EF4-FFF2-40B4-BE49-F238E27FC236}">
+                <a16:creationId xmlns:a16="http://schemas.microsoft.com/office/drawing/2014/main" id="{826A32F1-E7DE-4771-2D77-085AC45B8FE4}"/>
+              </a:ext>
+            </a:extLst>
+          </p:cNvPr>
+          <p:cNvGraphicFramePr>
+            <a:graphicFrameLocks noGrp="1"/>
+          </p:cNvGraphicFramePr>
+          <p:nvPr>
+            <p:extLst>
+              <p:ext uri="{D42A27DB-BD31-4B8C-83A1-F6EECF244321}">
+                <p14:modId xmlns:p14="http://schemas.microsoft.com/office/powerpoint/2010/main" val="2394998569"/>
+              </p:ext>
+            </p:extLst>
+          </p:nvPr>
+        </p:nvGraphicFramePr>
+        <p:xfrm>
+          <a:off x="1689100" y="1532466"/>
+          <a:ext cx="8077200" cy="4023360"/>
+        </p:xfrm>
+        <a:graphic>
+          <a:graphicData uri="http://schemas.openxmlformats.org/drawingml/2006/table">
+            <a:tbl>
+              <a:tblPr firstRow="1" bandRow="1">
+                <a:tableStyleId>{5C22544A-7EE6-4342-B048-85BDC9FD1C3A}</a:tableStyleId>
+              </a:tblPr>
+              <a:tblGrid>
+                <a:gridCol w="2777067">
+                  <a:extLst>
+                    <a:ext uri="{9D8B030D-6E8A-4147-A177-3AD203B41FA5}">
+                      <a16:colId xmlns:a16="http://schemas.microsoft.com/office/drawing/2014/main" val="3970483884"/>
+                    </a:ext>
+                  </a:extLst>
+                </a:gridCol>
+                <a:gridCol w="3585633">
+                  <a:extLst>
+                    <a:ext uri="{9D8B030D-6E8A-4147-A177-3AD203B41FA5}">
+                      <a16:colId xmlns:a16="http://schemas.microsoft.com/office/drawing/2014/main" val="2222360701"/>
+                    </a:ext>
+                  </a:extLst>
+                </a:gridCol>
+                <a:gridCol w="1714500">
+                  <a:extLst>
+                    <a:ext uri="{9D8B030D-6E8A-4147-A177-3AD203B41FA5}">
+                      <a16:colId xmlns:a16="http://schemas.microsoft.com/office/drawing/2014/main" val="246716077"/>
+                    </a:ext>
+                  </a:extLst>
+                </a:gridCol>
+              </a:tblGrid>
+              <a:tr h="510822">
+                <a:tc>
+                  <a:txBody>
+                    <a:bodyPr/>
+                    <a:lstStyle/>
+                    <a:p>
+                      <a:pPr lvl="0"/>
+                      <a:r>
+                        <a:rPr lang="en-US" dirty="0"/>
+                        <a:t>Source</a:t>
+                      </a:r>
+                    </a:p>
+                  </a:txBody>
+                  <a:tcPr/>
+                </a:tc>
+                <a:tc>
+                  <a:txBody>
+                    <a:bodyPr/>
+                    <a:lstStyle/>
+                    <a:p>
+                      <a:r>
+                        <a:rPr lang="en-US" dirty="0"/>
+                        <a:t>Configuration/ Role</a:t>
+                      </a:r>
+                    </a:p>
+                  </a:txBody>
+                  <a:tcPr/>
+                </a:tc>
+                <a:tc>
+                  <a:txBody>
+                    <a:bodyPr/>
+                    <a:lstStyle/>
+                    <a:p>
+                      <a:pPr algn="ctr"/>
+                      <a:r>
+                        <a:rPr lang="en-US" dirty="0"/>
+                        <a:t>Priority in Meeting Demand</a:t>
+                      </a:r>
+                    </a:p>
+                  </a:txBody>
+                  <a:tcPr/>
+                </a:tc>
+                <a:extLst>
+                  <a:ext uri="{0D108BD9-81ED-4DB2-BD59-A6C34878D82A}">
+                    <a16:rowId xmlns:a16="http://schemas.microsoft.com/office/drawing/2014/main" val="386839934"/>
+                  </a:ext>
+                </a:extLst>
+              </a:tr>
+              <a:tr h="510822">
+                <a:tc>
+                  <a:txBody>
+                    <a:bodyPr/>
+                    <a:lstStyle/>
+                    <a:p>
+                      <a:pPr lvl="0"/>
+                      <a:r>
+                        <a:rPr lang="en-US" dirty="0"/>
+                        <a:t>Existing 5MW Solar PPA</a:t>
+                      </a:r>
+                    </a:p>
+                  </a:txBody>
+                  <a:tcPr anchor="ctr"/>
+                </a:tc>
+                <a:tc>
+                  <a:txBody>
+                    <a:bodyPr/>
+                    <a:lstStyle/>
+                    <a:p>
+                      <a:r>
+                        <a:rPr lang="en-US" dirty="0"/>
+                        <a:t>Operates from Year 1 to 12 as primary source</a:t>
+                      </a:r>
+                    </a:p>
+                  </a:txBody>
+                  <a:tcPr anchor="ctr"/>
+                </a:tc>
+                <a:tc>
+                  <a:txBody>
+                    <a:bodyPr/>
+                    <a:lstStyle/>
+                    <a:p>
+                      <a:pPr algn="ctr"/>
+                      <a:r>
+                        <a:rPr lang="en-US" sz="2400" dirty="0"/>
+                        <a:t>1</a:t>
+                      </a:r>
+                    </a:p>
+                  </a:txBody>
+                  <a:tcPr anchor="ctr"/>
+                </a:tc>
+                <a:extLst>
+                  <a:ext uri="{0D108BD9-81ED-4DB2-BD59-A6C34878D82A}">
+                    <a16:rowId xmlns:a16="http://schemas.microsoft.com/office/drawing/2014/main" val="3327692913"/>
+                  </a:ext>
+                </a:extLst>
+              </a:tr>
+              <a:tr h="634154">
+                <a:tc>
+                  <a:txBody>
+                    <a:bodyPr/>
+                    <a:lstStyle/>
+                    <a:p>
+                      <a:pPr lvl="0"/>
+                      <a:r>
+                        <a:rPr lang="en-US" dirty="0"/>
+                        <a:t>Existing Diesel Generators</a:t>
+                      </a:r>
+                    </a:p>
+                  </a:txBody>
+                  <a:tcPr anchor="ctr"/>
+                </a:tc>
+                <a:tc>
+                  <a:txBody>
+                    <a:bodyPr/>
+                    <a:lstStyle/>
+                    <a:p>
+                      <a:r>
+                        <a:rPr lang="en-US" dirty="0"/>
+                        <a:t>6 x 1.5 MW operate from Year 1 to 12 as backup source</a:t>
+                      </a:r>
+                    </a:p>
+                  </a:txBody>
+                  <a:tcPr anchor="ctr"/>
+                </a:tc>
+                <a:tc>
+                  <a:txBody>
+                    <a:bodyPr/>
+                    <a:lstStyle/>
+                    <a:p>
+                      <a:pPr algn="ctr"/>
+                      <a:r>
+                        <a:rPr lang="en-US" sz="2400" dirty="0"/>
+                        <a:t>3</a:t>
+                      </a:r>
+                    </a:p>
+                  </a:txBody>
+                  <a:tcPr anchor="ctr"/>
+                </a:tc>
+                <a:extLst>
+                  <a:ext uri="{0D108BD9-81ED-4DB2-BD59-A6C34878D82A}">
+                    <a16:rowId xmlns:a16="http://schemas.microsoft.com/office/drawing/2014/main" val="2140261716"/>
+                  </a:ext>
+                </a:extLst>
+              </a:tr>
+              <a:tr h="647700">
+                <a:tc>
+                  <a:txBody>
+                    <a:bodyPr/>
+                    <a:lstStyle/>
+                    <a:p>
+                      <a:pPr lvl="0"/>
+                      <a:r>
+                        <a:rPr lang="en-US" dirty="0"/>
+                        <a:t>New Solar PPA</a:t>
+                      </a:r>
+                    </a:p>
+                  </a:txBody>
+                  <a:tcPr anchor="ctr"/>
+                </a:tc>
+                <a:tc>
+                  <a:txBody>
+                    <a:bodyPr/>
+                    <a:lstStyle/>
+                    <a:p>
+                      <a:r>
+                        <a:rPr lang="en-US" dirty="0"/>
+                        <a:t>35 MW added in Year 1, to operate till Year 12 and beyond, as primary source</a:t>
+                      </a:r>
+                    </a:p>
+                  </a:txBody>
+                  <a:tcPr anchor="ctr"/>
+                </a:tc>
+                <a:tc>
+                  <a:txBody>
+                    <a:bodyPr/>
+                    <a:lstStyle/>
+                    <a:p>
+                      <a:pPr algn="ctr"/>
+                      <a:r>
+                        <a:rPr lang="en-US" sz="2400" dirty="0"/>
+                        <a:t>1</a:t>
+                      </a:r>
+                    </a:p>
+                  </a:txBody>
+                  <a:tcPr anchor="ctr"/>
+                </a:tc>
+                <a:extLst>
+                  <a:ext uri="{0D108BD9-81ED-4DB2-BD59-A6C34878D82A}">
+                    <a16:rowId xmlns:a16="http://schemas.microsoft.com/office/drawing/2014/main" val="3250094683"/>
+                  </a:ext>
+                </a:extLst>
+              </a:tr>
+              <a:tr h="647700">
+                <a:tc>
+                  <a:txBody>
+                    <a:bodyPr/>
+                    <a:lstStyle/>
+                    <a:p>
+                      <a:pPr lvl="0"/>
+                      <a:r>
+                        <a:rPr lang="en-US" dirty="0"/>
+                        <a:t>New BESS PPA</a:t>
+                      </a:r>
+                    </a:p>
+                  </a:txBody>
+                  <a:tcPr anchor="ctr"/>
+                </a:tc>
+                <a:tc>
+                  <a:txBody>
+                    <a:bodyPr/>
+                    <a:lstStyle/>
+                    <a:p>
+                      <a:r>
+                        <a:rPr lang="en-US" dirty="0"/>
+                        <a:t>130 MWh added in Year 1 to operate till Year 12. First to respond to sudden and transient changes.</a:t>
+                      </a:r>
+                    </a:p>
+                  </a:txBody>
+                  <a:tcPr anchor="ctr"/>
+                </a:tc>
+                <a:tc>
+                  <a:txBody>
+                    <a:bodyPr/>
+                    <a:lstStyle/>
+                    <a:p>
+                      <a:pPr algn="ctr"/>
+                      <a:r>
+                        <a:rPr lang="en-US" sz="2400" dirty="0"/>
+                        <a:t>2</a:t>
+                      </a:r>
+                    </a:p>
+                  </a:txBody>
+                  <a:tcPr anchor="ctr"/>
+                </a:tc>
+                <a:extLst>
+                  <a:ext uri="{0D108BD9-81ED-4DB2-BD59-A6C34878D82A}">
+                    <a16:rowId xmlns:a16="http://schemas.microsoft.com/office/drawing/2014/main" val="386059280"/>
+                  </a:ext>
+                </a:extLst>
+              </a:tr>
+            </a:tbl>
+          </a:graphicData>
+        </a:graphic>
+      </p:graphicFrame>
+    </p:spTree>
+    <p:extLst>
+      <p:ext uri="{BB962C8B-B14F-4D97-AF65-F5344CB8AC3E}">
+        <p14:creationId xmlns:p14="http://schemas.microsoft.com/office/powerpoint/2010/main" val="3171801408"/>
+      </p:ext>
+    </p:extLst>
+  </p:cSld>
+  <p:clrMapOvr>
+    <a:masterClrMapping/>
+  </p:clrMapOvr>
+</p:sld>
+</file>
+
+<file path=ppt/slides/slide23.xml><?xml version="1.0" encoding="utf-8"?>
+<p:sld xmlns:a="http://schemas.openxmlformats.org/drawingml/2006/main" xmlns:r="http://schemas.openxmlformats.org/officeDocument/2006/relationships" xmlns:p="http://schemas.openxmlformats.org/presentationml/2006/main">
+  <p:cSld>
+    <p:spTree>
+      <p:nvGrpSpPr>
+        <p:cNvPr id="1" name=""/>
+        <p:cNvGrpSpPr/>
+        <p:nvPr/>
+      </p:nvGrpSpPr>
+      <p:grpSpPr>
+        <a:xfrm>
+          <a:off x="0" y="0"/>
+          <a:ext cx="0" cy="0"/>
+          <a:chOff x="0" y="0"/>
+          <a:chExt cx="0" cy="0"/>
+        </a:xfrm>
+      </p:grpSpPr>
+      <p:pic>
+        <p:nvPicPr>
+          <p:cNvPr id="5" name="Picture 4">
+            <a:extLst>
+              <a:ext uri="{FF2B5EF4-FFF2-40B4-BE49-F238E27FC236}">
+                <a16:creationId xmlns:a16="http://schemas.microsoft.com/office/drawing/2014/main" id="{36BAC3AD-5D7C-E463-B99C-38AEB05896E1}"/>
+              </a:ext>
+            </a:extLst>
+          </p:cNvPr>
+          <p:cNvPicPr>
+            <a:picLocks noChangeAspect="1"/>
+          </p:cNvPicPr>
+          <p:nvPr/>
+        </p:nvPicPr>
+        <p:blipFill>
+          <a:blip r:embed="rId2"/>
+          <a:stretch>
+            <a:fillRect/>
+          </a:stretch>
+        </p:blipFill>
+        <p:spPr>
+          <a:xfrm>
+            <a:off x="368487" y="1544172"/>
+            <a:ext cx="8620125" cy="4191000"/>
+          </a:xfrm>
+          <a:prstGeom prst="rect">
+            <a:avLst/>
+          </a:prstGeom>
+        </p:spPr>
+      </p:pic>
+      <p:sp>
+        <p:nvSpPr>
+          <p:cNvPr id="8" name="Rectangle 7">
+            <a:extLst>
+              <a:ext uri="{FF2B5EF4-FFF2-40B4-BE49-F238E27FC236}">
+                <a16:creationId xmlns:a16="http://schemas.microsoft.com/office/drawing/2014/main" id="{3B19791E-7559-E149-CC7A-4A3B0F837C0C}"/>
+              </a:ext>
+            </a:extLst>
+          </p:cNvPr>
+          <p:cNvSpPr/>
+          <p:nvPr/>
+        </p:nvSpPr>
+        <p:spPr>
+          <a:xfrm>
+            <a:off x="368487" y="476497"/>
+            <a:ext cx="7273250" cy="646331"/>
+          </a:xfrm>
+          <a:prstGeom prst="rect">
+            <a:avLst/>
+          </a:prstGeom>
+          <a:noFill/>
+        </p:spPr>
+        <p:txBody>
+          <a:bodyPr wrap="square" lIns="91440" tIns="45720" rIns="91440" bIns="45720">
+            <a:spAutoFit/>
+          </a:bodyPr>
+          <a:lstStyle/>
+          <a:p>
+            <a:r>
+              <a:rPr lang="en-US" sz="3600" b="1" cap="none" spc="0" dirty="0">
+                <a:ln w="0"/>
+                <a:solidFill>
+                  <a:srgbClr val="44546A"/>
+                </a:solidFill>
+                <a:effectLst>
+                  <a:outerShdw blurRad="38100" dist="19050" dir="2700000" algn="tl" rotWithShape="0">
+                    <a:schemeClr val="dk1">
+                      <a:alpha val="40000"/>
+                    </a:schemeClr>
+                  </a:outerShdw>
+                </a:effectLst>
+                <a:latin typeface="+mj-lt"/>
+              </a:rPr>
+              <a:t>Scenario 1: Outcomes Summary</a:t>
+            </a:r>
+          </a:p>
+        </p:txBody>
+      </p:sp>
+      <p:sp>
+        <p:nvSpPr>
+          <p:cNvPr id="11" name="TextBox 10">
+            <a:extLst>
+              <a:ext uri="{FF2B5EF4-FFF2-40B4-BE49-F238E27FC236}">
+                <a16:creationId xmlns:a16="http://schemas.microsoft.com/office/drawing/2014/main" id="{4E8298CA-C516-E735-DA20-BE1A45F50CA4}"/>
+              </a:ext>
+            </a:extLst>
+          </p:cNvPr>
+          <p:cNvSpPr txBox="1"/>
+          <p:nvPr/>
+        </p:nvSpPr>
+        <p:spPr>
+          <a:xfrm>
+            <a:off x="9090212" y="1544172"/>
+            <a:ext cx="2838612" cy="4201150"/>
+          </a:xfrm>
+          <a:prstGeom prst="rect">
+            <a:avLst/>
+          </a:prstGeom>
+          <a:noFill/>
+          <a:ln>
+            <a:solidFill>
+              <a:schemeClr val="accent2"/>
+            </a:solidFill>
+          </a:ln>
+        </p:spPr>
+        <p:txBody>
+          <a:bodyPr wrap="square" rtlCol="0">
+            <a:spAutoFit/>
+          </a:bodyPr>
+          <a:lstStyle/>
+          <a:p>
+            <a:pPr marL="285750" indent="-285750">
+              <a:spcAft>
+                <a:spcPts val="600"/>
+              </a:spcAft>
+              <a:buFontTx/>
+              <a:buChar char="-"/>
+            </a:pPr>
+            <a:r>
+              <a:rPr lang="en-US" dirty="0"/>
+              <a:t>High Unit costs</a:t>
+            </a:r>
+          </a:p>
+          <a:p>
+            <a:pPr marL="285750" indent="-285750">
+              <a:spcAft>
+                <a:spcPts val="600"/>
+              </a:spcAft>
+              <a:buFontTx/>
+              <a:buChar char="-"/>
+            </a:pPr>
+            <a:r>
+              <a:rPr lang="en-US" dirty="0"/>
+              <a:t>High number of critical load interruptions especially in Years 7 to 12.</a:t>
+            </a:r>
+          </a:p>
+          <a:p>
+            <a:pPr marL="285750" indent="-285750">
+              <a:spcAft>
+                <a:spcPts val="600"/>
+              </a:spcAft>
+              <a:buFontTx/>
+              <a:buChar char="-"/>
+            </a:pPr>
+            <a:r>
+              <a:rPr lang="en-US" dirty="0"/>
+              <a:t>Years 6 to 11 have less than 100% energy fulfilment ratio, which means inadequacy of power sources leading to critical load shedding and production losses</a:t>
+            </a:r>
+          </a:p>
+          <a:p>
+            <a:pPr marL="285750" indent="-285750">
+              <a:spcAft>
+                <a:spcPts val="600"/>
+              </a:spcAft>
+              <a:buFontTx/>
+              <a:buChar char="-"/>
+            </a:pPr>
+            <a:r>
+              <a:rPr lang="en-US" dirty="0"/>
+              <a:t>High incidence of non-critical load shedding</a:t>
+            </a:r>
+          </a:p>
+        </p:txBody>
+      </p:sp>
+    </p:spTree>
+    <p:extLst>
+      <p:ext uri="{BB962C8B-B14F-4D97-AF65-F5344CB8AC3E}">
+        <p14:creationId xmlns:p14="http://schemas.microsoft.com/office/powerpoint/2010/main" val="1471702528"/>
+      </p:ext>
+    </p:extLst>
+  </p:cSld>
+  <p:clrMapOvr>
+    <a:masterClrMapping/>
+  </p:clrMapOvr>
+</p:sld>
+</file>
+
+<file path=ppt/slides/slide24.xml><?xml version="1.0" encoding="utf-8"?>
+<p:sld xmlns:a="http://schemas.openxmlformats.org/drawingml/2006/main" xmlns:r="http://schemas.openxmlformats.org/officeDocument/2006/relationships" xmlns:p="http://schemas.openxmlformats.org/presentationml/2006/main">
+  <p:cSld>
+    <p:spTree>
+      <p:nvGrpSpPr>
+        <p:cNvPr id="1" name=""/>
+        <p:cNvGrpSpPr/>
+        <p:nvPr/>
+      </p:nvGrpSpPr>
+      <p:grpSpPr>
+        <a:xfrm>
+          <a:off x="0" y="0"/>
+          <a:ext cx="0" cy="0"/>
+          <a:chOff x="0" y="0"/>
+          <a:chExt cx="0" cy="0"/>
+        </a:xfrm>
+      </p:grpSpPr>
+      <p:sp>
+        <p:nvSpPr>
+          <p:cNvPr id="8" name="Rectangle 7">
+            <a:extLst>
+              <a:ext uri="{FF2B5EF4-FFF2-40B4-BE49-F238E27FC236}">
+                <a16:creationId xmlns:a16="http://schemas.microsoft.com/office/drawing/2014/main" id="{3B19791E-7559-E149-CC7A-4A3B0F837C0C}"/>
+              </a:ext>
+            </a:extLst>
+          </p:cNvPr>
+          <p:cNvSpPr/>
+          <p:nvPr/>
+        </p:nvSpPr>
+        <p:spPr>
+          <a:xfrm>
+            <a:off x="402876" y="472799"/>
+            <a:ext cx="8827036" cy="646331"/>
+          </a:xfrm>
+          <a:prstGeom prst="rect">
+            <a:avLst/>
+          </a:prstGeom>
+          <a:noFill/>
+        </p:spPr>
+        <p:txBody>
+          <a:bodyPr wrap="square" lIns="91440" tIns="45720" rIns="91440" bIns="45720">
+            <a:spAutoFit/>
+          </a:bodyPr>
+          <a:lstStyle/>
+          <a:p>
+            <a:r>
+              <a:rPr lang="en-US" sz="3600" b="1" cap="none" spc="0" dirty="0">
+                <a:ln w="0"/>
+                <a:solidFill>
+                  <a:srgbClr val="44546A"/>
+                </a:solidFill>
+                <a:effectLst>
+                  <a:outerShdw blurRad="38100" dist="19050" dir="2700000" algn="tl" rotWithShape="0">
+                    <a:schemeClr val="dk1">
+                      <a:alpha val="40000"/>
+                    </a:schemeClr>
+                  </a:outerShdw>
+                </a:effectLst>
+                <a:latin typeface="+mj-lt"/>
+              </a:rPr>
+              <a:t>Scenario 1: Source and Year wise breakdown</a:t>
+            </a:r>
+          </a:p>
+        </p:txBody>
+      </p:sp>
+      <p:sp>
+        <p:nvSpPr>
+          <p:cNvPr id="11" name="TextBox 10">
+            <a:extLst>
+              <a:ext uri="{FF2B5EF4-FFF2-40B4-BE49-F238E27FC236}">
+                <a16:creationId xmlns:a16="http://schemas.microsoft.com/office/drawing/2014/main" id="{4E8298CA-C516-E735-DA20-BE1A45F50CA4}"/>
+              </a:ext>
+            </a:extLst>
+          </p:cNvPr>
+          <p:cNvSpPr txBox="1"/>
+          <p:nvPr/>
+        </p:nvSpPr>
+        <p:spPr>
+          <a:xfrm>
+            <a:off x="5869029" y="4280831"/>
+            <a:ext cx="5704300" cy="1908215"/>
+          </a:xfrm>
+          <a:prstGeom prst="rect">
+            <a:avLst/>
+          </a:prstGeom>
+          <a:noFill/>
+          <a:ln>
+            <a:solidFill>
+              <a:schemeClr val="accent2"/>
+            </a:solidFill>
+          </a:ln>
+        </p:spPr>
+        <p:txBody>
+          <a:bodyPr wrap="square" rtlCol="0">
+            <a:spAutoFit/>
+          </a:bodyPr>
+          <a:lstStyle/>
+          <a:p>
+            <a:pPr marL="285750" indent="-285750">
+              <a:spcAft>
+                <a:spcPts val="600"/>
+              </a:spcAft>
+              <a:buFontTx/>
+              <a:buChar char="-"/>
+            </a:pPr>
+            <a:r>
+              <a:rPr lang="en-US" dirty="0"/>
+              <a:t>Almost 32% of the energy required to feed the demand and charge BESS is provided by diesel generators. </a:t>
+            </a:r>
+          </a:p>
+          <a:p>
+            <a:pPr marL="285750" indent="-285750">
+              <a:spcAft>
+                <a:spcPts val="600"/>
+              </a:spcAft>
+              <a:buFontTx/>
+              <a:buChar char="-"/>
+            </a:pPr>
+            <a:r>
+              <a:rPr lang="en-US" dirty="0"/>
+              <a:t>This is the key reason behind high overall and unit costs in this scenario.</a:t>
+            </a:r>
+          </a:p>
+          <a:p>
+            <a:pPr marL="285750" indent="-285750">
+              <a:spcAft>
+                <a:spcPts val="600"/>
+              </a:spcAft>
+              <a:buFontTx/>
+              <a:buChar char="-"/>
+            </a:pPr>
+            <a:r>
+              <a:rPr lang="en-US" b="1" dirty="0"/>
+              <a:t>Clearly a better ratio of Solar power to BESS storage needs to be established, which is achieved in Sc 2 </a:t>
+            </a:r>
+          </a:p>
+        </p:txBody>
+      </p:sp>
+      <p:pic>
+        <p:nvPicPr>
+          <p:cNvPr id="3" name="Picture 2">
+            <a:extLst>
+              <a:ext uri="{FF2B5EF4-FFF2-40B4-BE49-F238E27FC236}">
+                <a16:creationId xmlns:a16="http://schemas.microsoft.com/office/drawing/2014/main" id="{DEA20B77-8C39-7FAD-2FA8-58B960710284}"/>
+              </a:ext>
+            </a:extLst>
+          </p:cNvPr>
+          <p:cNvPicPr>
+            <a:picLocks noChangeAspect="1"/>
+          </p:cNvPicPr>
+          <p:nvPr/>
+        </p:nvPicPr>
+        <p:blipFill>
+          <a:blip r:embed="rId2"/>
+          <a:stretch>
+            <a:fillRect/>
+          </a:stretch>
+        </p:blipFill>
+        <p:spPr>
+          <a:xfrm>
+            <a:off x="491776" y="1372160"/>
+            <a:ext cx="5223224" cy="4001278"/>
+          </a:xfrm>
+          <a:prstGeom prst="rect">
+            <a:avLst/>
+          </a:prstGeom>
+        </p:spPr>
+      </p:pic>
+      <p:pic>
+        <p:nvPicPr>
+          <p:cNvPr id="9" name="Picture 8">
+            <a:extLst>
+              <a:ext uri="{FF2B5EF4-FFF2-40B4-BE49-F238E27FC236}">
+                <a16:creationId xmlns:a16="http://schemas.microsoft.com/office/drawing/2014/main" id="{C443E937-5DCE-C61F-D0A2-E7D2A530145A}"/>
+              </a:ext>
+            </a:extLst>
+          </p:cNvPr>
+          <p:cNvPicPr>
+            <a:picLocks noChangeAspect="1"/>
+          </p:cNvPicPr>
+          <p:nvPr/>
+        </p:nvPicPr>
+        <p:blipFill>
+          <a:blip r:embed="rId3"/>
+          <a:stretch>
+            <a:fillRect/>
+          </a:stretch>
+        </p:blipFill>
+        <p:spPr>
+          <a:xfrm>
+            <a:off x="5869029" y="1372160"/>
+            <a:ext cx="5704300" cy="2846819"/>
+          </a:xfrm>
+          <a:prstGeom prst="rect">
+            <a:avLst/>
+          </a:prstGeom>
+        </p:spPr>
+      </p:pic>
+    </p:spTree>
+    <p:extLst>
+      <p:ext uri="{BB962C8B-B14F-4D97-AF65-F5344CB8AC3E}">
+        <p14:creationId xmlns:p14="http://schemas.microsoft.com/office/powerpoint/2010/main" val="354493606"/>
+      </p:ext>
+    </p:extLst>
+  </p:cSld>
+  <p:clrMapOvr>
+    <a:masterClrMapping/>
+  </p:clrMapOvr>
+</p:sld>
+</file>
+
+<file path=ppt/slides/slide25.xml><?xml version="1.0" encoding="utf-8"?>
+<p:sld xmlns:a="http://schemas.openxmlformats.org/drawingml/2006/main" xmlns:r="http://schemas.openxmlformats.org/officeDocument/2006/relationships" xmlns:p="http://schemas.openxmlformats.org/presentationml/2006/main">
+  <p:cSld>
+    <p:spTree>
+      <p:nvGrpSpPr>
+        <p:cNvPr id="1" name=""/>
+        <p:cNvGrpSpPr/>
+        <p:nvPr/>
+      </p:nvGrpSpPr>
+      <p:grpSpPr>
+        <a:xfrm>
+          <a:off x="0" y="0"/>
+          <a:ext cx="0" cy="0"/>
+          <a:chOff x="0" y="0"/>
+          <a:chExt cx="0" cy="0"/>
+        </a:xfrm>
+      </p:grpSpPr>
+      <p:sp>
+        <p:nvSpPr>
+          <p:cNvPr id="8" name="Rectangle 7">
+            <a:extLst>
+              <a:ext uri="{FF2B5EF4-FFF2-40B4-BE49-F238E27FC236}">
+                <a16:creationId xmlns:a16="http://schemas.microsoft.com/office/drawing/2014/main" id="{3B19791E-7559-E149-CC7A-4A3B0F837C0C}"/>
+              </a:ext>
+            </a:extLst>
+          </p:cNvPr>
+          <p:cNvSpPr/>
+          <p:nvPr/>
+        </p:nvSpPr>
+        <p:spPr>
+          <a:xfrm>
+            <a:off x="339376" y="485499"/>
+            <a:ext cx="7273250" cy="646331"/>
+          </a:xfrm>
+          <a:prstGeom prst="rect">
+            <a:avLst/>
+          </a:prstGeom>
+          <a:noFill/>
+        </p:spPr>
+        <p:txBody>
+          <a:bodyPr wrap="square" lIns="91440" tIns="45720" rIns="91440" bIns="45720">
+            <a:spAutoFit/>
+          </a:bodyPr>
+          <a:lstStyle/>
+          <a:p>
+            <a:r>
+              <a:rPr lang="en-US" sz="3600" b="1" cap="none" spc="0" dirty="0">
+                <a:ln w="0"/>
+                <a:solidFill>
+                  <a:srgbClr val="44546A"/>
+                </a:solidFill>
+                <a:effectLst>
+                  <a:outerShdw blurRad="38100" dist="19050" dir="2700000" algn="tl" rotWithShape="0">
+                    <a:schemeClr val="dk1">
+                      <a:alpha val="40000"/>
+                    </a:schemeClr>
+                  </a:outerShdw>
+                </a:effectLst>
+                <a:latin typeface="+mj-lt"/>
+              </a:rPr>
+              <a:t>Scenario </a:t>
+            </a:r>
+            <a:r>
+              <a:rPr lang="en-US" sz="3600" b="1" dirty="0">
+                <a:ln w="0"/>
+                <a:solidFill>
+                  <a:srgbClr val="44546A"/>
+                </a:solidFill>
+                <a:effectLst>
+                  <a:outerShdw blurRad="38100" dist="19050" dir="2700000" algn="tl" rotWithShape="0">
+                    <a:schemeClr val="dk1">
+                      <a:alpha val="40000"/>
+                    </a:schemeClr>
+                  </a:outerShdw>
+                </a:effectLst>
+                <a:latin typeface="+mj-lt"/>
+              </a:rPr>
+              <a:t>2</a:t>
+            </a:r>
+            <a:r>
+              <a:rPr lang="en-US" sz="3600" b="1" cap="none" spc="0" dirty="0">
+                <a:ln w="0"/>
+                <a:solidFill>
+                  <a:srgbClr val="44546A"/>
+                </a:solidFill>
+                <a:effectLst>
+                  <a:outerShdw blurRad="38100" dist="19050" dir="2700000" algn="tl" rotWithShape="0">
+                    <a:schemeClr val="dk1">
+                      <a:alpha val="40000"/>
+                    </a:schemeClr>
+                  </a:outerShdw>
+                </a:effectLst>
+                <a:latin typeface="+mj-lt"/>
+              </a:rPr>
+              <a:t>: Configuration</a:t>
+            </a:r>
+          </a:p>
+        </p:txBody>
+      </p:sp>
+      <p:graphicFrame>
+        <p:nvGraphicFramePr>
+          <p:cNvPr id="4" name="Table 3">
+            <a:extLst>
+              <a:ext uri="{FF2B5EF4-FFF2-40B4-BE49-F238E27FC236}">
+                <a16:creationId xmlns:a16="http://schemas.microsoft.com/office/drawing/2014/main" id="{4D10EE2A-787F-7494-5A47-B2C352ED3BEF}"/>
+              </a:ext>
+            </a:extLst>
+          </p:cNvPr>
+          <p:cNvGraphicFramePr>
+            <a:graphicFrameLocks noGrp="1"/>
+          </p:cNvGraphicFramePr>
+          <p:nvPr>
+            <p:extLst>
+              <p:ext uri="{D42A27DB-BD31-4B8C-83A1-F6EECF244321}">
+                <p14:modId xmlns:p14="http://schemas.microsoft.com/office/powerpoint/2010/main" val="812887990"/>
+              </p:ext>
+            </p:extLst>
+          </p:nvPr>
+        </p:nvGraphicFramePr>
+        <p:xfrm>
+          <a:off x="2057400" y="1595120"/>
+          <a:ext cx="8077200" cy="4023360"/>
+        </p:xfrm>
+        <a:graphic>
+          <a:graphicData uri="http://schemas.openxmlformats.org/drawingml/2006/table">
+            <a:tbl>
+              <a:tblPr firstRow="1" bandRow="1">
+                <a:tableStyleId>{5C22544A-7EE6-4342-B048-85BDC9FD1C3A}</a:tableStyleId>
+              </a:tblPr>
+              <a:tblGrid>
+                <a:gridCol w="2777067">
+                  <a:extLst>
+                    <a:ext uri="{9D8B030D-6E8A-4147-A177-3AD203B41FA5}">
+                      <a16:colId xmlns:a16="http://schemas.microsoft.com/office/drawing/2014/main" val="3970483884"/>
+                    </a:ext>
+                  </a:extLst>
+                </a:gridCol>
+                <a:gridCol w="3585633">
+                  <a:extLst>
+                    <a:ext uri="{9D8B030D-6E8A-4147-A177-3AD203B41FA5}">
+                      <a16:colId xmlns:a16="http://schemas.microsoft.com/office/drawing/2014/main" val="2222360701"/>
+                    </a:ext>
+                  </a:extLst>
+                </a:gridCol>
+                <a:gridCol w="1714500">
+                  <a:extLst>
+                    <a:ext uri="{9D8B030D-6E8A-4147-A177-3AD203B41FA5}">
+                      <a16:colId xmlns:a16="http://schemas.microsoft.com/office/drawing/2014/main" val="246716077"/>
+                    </a:ext>
+                  </a:extLst>
+                </a:gridCol>
+              </a:tblGrid>
+              <a:tr h="510822">
+                <a:tc>
+                  <a:txBody>
+                    <a:bodyPr/>
+                    <a:lstStyle/>
+                    <a:p>
+                      <a:pPr lvl="0"/>
+                      <a:r>
+                        <a:rPr lang="en-US" dirty="0"/>
+                        <a:t>Source</a:t>
+                      </a:r>
+                    </a:p>
+                  </a:txBody>
+                  <a:tcPr/>
+                </a:tc>
+                <a:tc>
+                  <a:txBody>
+                    <a:bodyPr/>
+                    <a:lstStyle/>
+                    <a:p>
+                      <a:r>
+                        <a:rPr lang="en-US" dirty="0"/>
+                        <a:t>Configuration/ Role</a:t>
+                      </a:r>
+                    </a:p>
+                  </a:txBody>
+                  <a:tcPr/>
+                </a:tc>
+                <a:tc>
+                  <a:txBody>
+                    <a:bodyPr/>
+                    <a:lstStyle/>
+                    <a:p>
+                      <a:pPr algn="ctr"/>
+                      <a:r>
+                        <a:rPr lang="en-US" dirty="0"/>
+                        <a:t>Priority in Meeting Demand</a:t>
+                      </a:r>
+                    </a:p>
+                  </a:txBody>
+                  <a:tcPr/>
+                </a:tc>
+                <a:extLst>
+                  <a:ext uri="{0D108BD9-81ED-4DB2-BD59-A6C34878D82A}">
+                    <a16:rowId xmlns:a16="http://schemas.microsoft.com/office/drawing/2014/main" val="386839934"/>
+                  </a:ext>
+                </a:extLst>
+              </a:tr>
+              <a:tr h="510822">
+                <a:tc>
+                  <a:txBody>
+                    <a:bodyPr/>
+                    <a:lstStyle/>
+                    <a:p>
+                      <a:pPr lvl="0"/>
+                      <a:r>
+                        <a:rPr lang="en-US" dirty="0"/>
+                        <a:t>Existing 5MW Solar PPA</a:t>
+                      </a:r>
+                    </a:p>
+                  </a:txBody>
+                  <a:tcPr anchor="ctr"/>
+                </a:tc>
+                <a:tc>
+                  <a:txBody>
+                    <a:bodyPr/>
+                    <a:lstStyle/>
+                    <a:p>
+                      <a:r>
+                        <a:rPr lang="en-US" dirty="0"/>
+                        <a:t>Operates from Year 1 to 12 as primary source</a:t>
+                      </a:r>
+                    </a:p>
+                  </a:txBody>
+                  <a:tcPr anchor="ctr"/>
+                </a:tc>
+                <a:tc>
+                  <a:txBody>
+                    <a:bodyPr/>
+                    <a:lstStyle/>
+                    <a:p>
+                      <a:pPr algn="ctr"/>
+                      <a:r>
+                        <a:rPr lang="en-US" sz="2400" dirty="0"/>
+                        <a:t>1</a:t>
+                      </a:r>
+                    </a:p>
+                  </a:txBody>
+                  <a:tcPr anchor="ctr"/>
+                </a:tc>
+                <a:extLst>
+                  <a:ext uri="{0D108BD9-81ED-4DB2-BD59-A6C34878D82A}">
+                    <a16:rowId xmlns:a16="http://schemas.microsoft.com/office/drawing/2014/main" val="3327692913"/>
+                  </a:ext>
+                </a:extLst>
+              </a:tr>
+              <a:tr h="634154">
+                <a:tc>
+                  <a:txBody>
+                    <a:bodyPr/>
+                    <a:lstStyle/>
+                    <a:p>
+                      <a:pPr lvl="0"/>
+                      <a:r>
+                        <a:rPr lang="en-US" dirty="0"/>
+                        <a:t>Existing Diesel Generators</a:t>
+                      </a:r>
+                    </a:p>
+                  </a:txBody>
+                  <a:tcPr anchor="ctr"/>
+                </a:tc>
+                <a:tc>
+                  <a:txBody>
+                    <a:bodyPr/>
+                    <a:lstStyle/>
+                    <a:p>
+                      <a:r>
+                        <a:rPr lang="en-US" dirty="0"/>
+                        <a:t>6 x 1.5 MW operate from Year 1 to 12 as backup source</a:t>
+                      </a:r>
+                    </a:p>
+                  </a:txBody>
+                  <a:tcPr anchor="ctr"/>
+                </a:tc>
+                <a:tc>
+                  <a:txBody>
+                    <a:bodyPr/>
+                    <a:lstStyle/>
+                    <a:p>
+                      <a:pPr algn="ctr"/>
+                      <a:r>
+                        <a:rPr lang="en-US" sz="2400" dirty="0"/>
+                        <a:t>3</a:t>
+                      </a:r>
+                    </a:p>
+                  </a:txBody>
+                  <a:tcPr anchor="ctr"/>
+                </a:tc>
+                <a:extLst>
+                  <a:ext uri="{0D108BD9-81ED-4DB2-BD59-A6C34878D82A}">
+                    <a16:rowId xmlns:a16="http://schemas.microsoft.com/office/drawing/2014/main" val="2140261716"/>
+                  </a:ext>
+                </a:extLst>
+              </a:tr>
+              <a:tr h="647700">
+                <a:tc>
+                  <a:txBody>
+                    <a:bodyPr/>
+                    <a:lstStyle/>
+                    <a:p>
+                      <a:pPr lvl="0"/>
+                      <a:r>
+                        <a:rPr lang="en-US" dirty="0"/>
+                        <a:t>New Solar PPA</a:t>
+                      </a:r>
+                    </a:p>
+                  </a:txBody>
+                  <a:tcPr anchor="ctr"/>
+                </a:tc>
+                <a:tc>
+                  <a:txBody>
+                    <a:bodyPr/>
+                    <a:lstStyle/>
+                    <a:p>
+                      <a:r>
+                        <a:rPr lang="en-US" dirty="0"/>
+                        <a:t>55 MW added in Year 1, to operate till Year 12 and beyond, as primary source</a:t>
+                      </a:r>
+                    </a:p>
+                  </a:txBody>
+                  <a:tcPr anchor="ctr"/>
+                </a:tc>
+                <a:tc>
+                  <a:txBody>
+                    <a:bodyPr/>
+                    <a:lstStyle/>
+                    <a:p>
+                      <a:pPr algn="ctr"/>
+                      <a:r>
+                        <a:rPr lang="en-US" sz="2400" dirty="0"/>
+                        <a:t>1</a:t>
+                      </a:r>
+                    </a:p>
+                  </a:txBody>
+                  <a:tcPr anchor="ctr"/>
+                </a:tc>
+                <a:extLst>
+                  <a:ext uri="{0D108BD9-81ED-4DB2-BD59-A6C34878D82A}">
+                    <a16:rowId xmlns:a16="http://schemas.microsoft.com/office/drawing/2014/main" val="3250094683"/>
+                  </a:ext>
+                </a:extLst>
+              </a:tr>
+              <a:tr h="647700">
+                <a:tc>
+                  <a:txBody>
+                    <a:bodyPr/>
+                    <a:lstStyle/>
+                    <a:p>
+                      <a:pPr lvl="0"/>
+                      <a:r>
+                        <a:rPr lang="en-US" dirty="0"/>
+                        <a:t>New BESS PPA</a:t>
+                      </a:r>
+                    </a:p>
+                  </a:txBody>
+                  <a:tcPr anchor="ctr"/>
+                </a:tc>
+                <a:tc>
+                  <a:txBody>
+                    <a:bodyPr/>
+                    <a:lstStyle/>
+                    <a:p>
+                      <a:r>
+                        <a:rPr lang="en-US" dirty="0"/>
+                        <a:t>95 MWh added in Year 1 to operate till Year 12. First to respond to sudden and transient changes.</a:t>
+                      </a:r>
+                    </a:p>
+                  </a:txBody>
+                  <a:tcPr anchor="ctr"/>
+                </a:tc>
+                <a:tc>
+                  <a:txBody>
+                    <a:bodyPr/>
+                    <a:lstStyle/>
+                    <a:p>
+                      <a:pPr algn="ctr"/>
+                      <a:r>
+                        <a:rPr lang="en-US" sz="2400" dirty="0"/>
+                        <a:t>2</a:t>
+                      </a:r>
+                    </a:p>
+                  </a:txBody>
+                  <a:tcPr anchor="ctr"/>
+                </a:tc>
+                <a:extLst>
+                  <a:ext uri="{0D108BD9-81ED-4DB2-BD59-A6C34878D82A}">
+                    <a16:rowId xmlns:a16="http://schemas.microsoft.com/office/drawing/2014/main" val="386059280"/>
+                  </a:ext>
+                </a:extLst>
+              </a:tr>
+            </a:tbl>
+          </a:graphicData>
+        </a:graphic>
+      </p:graphicFrame>
+    </p:spTree>
+    <p:extLst>
+      <p:ext uri="{BB962C8B-B14F-4D97-AF65-F5344CB8AC3E}">
+        <p14:creationId xmlns:p14="http://schemas.microsoft.com/office/powerpoint/2010/main" val="3389717651"/>
+      </p:ext>
+    </p:extLst>
+  </p:cSld>
+  <p:clrMapOvr>
+    <a:masterClrMapping/>
+  </p:clrMapOvr>
+</p:sld>
+</file>
+
+<file path=ppt/slides/slide26.xml><?xml version="1.0" encoding="utf-8"?>
+<p:sld xmlns:a="http://schemas.openxmlformats.org/drawingml/2006/main" xmlns:r="http://schemas.openxmlformats.org/officeDocument/2006/relationships" xmlns:p="http://schemas.openxmlformats.org/presentationml/2006/main">
+  <p:cSld>
+    <p:spTree>
+      <p:nvGrpSpPr>
+        <p:cNvPr id="1" name=""/>
+        <p:cNvGrpSpPr/>
+        <p:nvPr/>
+      </p:nvGrpSpPr>
+      <p:grpSpPr>
+        <a:xfrm>
+          <a:off x="0" y="0"/>
+          <a:ext cx="0" cy="0"/>
+          <a:chOff x="0" y="0"/>
+          <a:chExt cx="0" cy="0"/>
+        </a:xfrm>
+      </p:grpSpPr>
+      <p:sp>
+        <p:nvSpPr>
+          <p:cNvPr id="8" name="Rectangle 7">
+            <a:extLst>
+              <a:ext uri="{FF2B5EF4-FFF2-40B4-BE49-F238E27FC236}">
+                <a16:creationId xmlns:a16="http://schemas.microsoft.com/office/drawing/2014/main" id="{3B19791E-7559-E149-CC7A-4A3B0F837C0C}"/>
+              </a:ext>
+            </a:extLst>
+          </p:cNvPr>
+          <p:cNvSpPr/>
+          <p:nvPr/>
+        </p:nvSpPr>
+        <p:spPr>
+          <a:xfrm>
+            <a:off x="339376" y="485499"/>
+            <a:ext cx="7273250" cy="646331"/>
+          </a:xfrm>
+          <a:prstGeom prst="rect">
+            <a:avLst/>
+          </a:prstGeom>
+          <a:noFill/>
+        </p:spPr>
+        <p:txBody>
+          <a:bodyPr wrap="square" lIns="91440" tIns="45720" rIns="91440" bIns="45720">
+            <a:spAutoFit/>
+          </a:bodyPr>
+          <a:lstStyle/>
+          <a:p>
+            <a:r>
+              <a:rPr lang="en-US" sz="3600" b="1" cap="none" spc="0" dirty="0">
+                <a:ln w="0"/>
+                <a:solidFill>
+                  <a:srgbClr val="44546A"/>
+                </a:solidFill>
+                <a:effectLst>
+                  <a:outerShdw blurRad="38100" dist="19050" dir="2700000" algn="tl" rotWithShape="0">
+                    <a:schemeClr val="dk1">
+                      <a:alpha val="40000"/>
+                    </a:schemeClr>
+                  </a:outerShdw>
+                </a:effectLst>
+                <a:latin typeface="+mj-lt"/>
+              </a:rPr>
+              <a:t>Scenario </a:t>
+            </a:r>
+            <a:r>
+              <a:rPr lang="en-US" sz="3600" b="1" dirty="0">
+                <a:ln w="0"/>
+                <a:solidFill>
+                  <a:srgbClr val="44546A"/>
+                </a:solidFill>
+                <a:effectLst>
+                  <a:outerShdw blurRad="38100" dist="19050" dir="2700000" algn="tl" rotWithShape="0">
+                    <a:schemeClr val="dk1">
+                      <a:alpha val="40000"/>
+                    </a:schemeClr>
+                  </a:outerShdw>
+                </a:effectLst>
+                <a:latin typeface="+mj-lt"/>
+              </a:rPr>
+              <a:t>2</a:t>
+            </a:r>
+            <a:r>
+              <a:rPr lang="en-US" sz="3600" b="1" cap="none" spc="0" dirty="0">
+                <a:ln w="0"/>
+                <a:solidFill>
+                  <a:srgbClr val="44546A"/>
+                </a:solidFill>
+                <a:effectLst>
+                  <a:outerShdw blurRad="38100" dist="19050" dir="2700000" algn="tl" rotWithShape="0">
+                    <a:schemeClr val="dk1">
+                      <a:alpha val="40000"/>
+                    </a:schemeClr>
+                  </a:outerShdw>
+                </a:effectLst>
+                <a:latin typeface="+mj-lt"/>
+              </a:rPr>
+              <a:t>: Summary</a:t>
+            </a:r>
+          </a:p>
+        </p:txBody>
+      </p:sp>
+      <p:sp>
+        <p:nvSpPr>
+          <p:cNvPr id="11" name="TextBox 10">
+            <a:extLst>
+              <a:ext uri="{FF2B5EF4-FFF2-40B4-BE49-F238E27FC236}">
+                <a16:creationId xmlns:a16="http://schemas.microsoft.com/office/drawing/2014/main" id="{4E8298CA-C516-E735-DA20-BE1A45F50CA4}"/>
+              </a:ext>
+            </a:extLst>
+          </p:cNvPr>
+          <p:cNvSpPr txBox="1"/>
+          <p:nvPr/>
+        </p:nvSpPr>
+        <p:spPr>
+          <a:xfrm>
+            <a:off x="9047841" y="1544172"/>
+            <a:ext cx="2838612" cy="2939266"/>
+          </a:xfrm>
+          <a:prstGeom prst="rect">
+            <a:avLst/>
+          </a:prstGeom>
+          <a:noFill/>
+          <a:ln>
+            <a:solidFill>
+              <a:schemeClr val="accent2"/>
+            </a:solidFill>
+          </a:ln>
+        </p:spPr>
+        <p:txBody>
+          <a:bodyPr wrap="square" rtlCol="0">
+            <a:spAutoFit/>
+          </a:bodyPr>
+          <a:lstStyle/>
+          <a:p>
+            <a:pPr marL="285750" indent="-285750">
+              <a:spcAft>
+                <a:spcPts val="600"/>
+              </a:spcAft>
+              <a:buFontTx/>
+              <a:buChar char="-"/>
+            </a:pPr>
+            <a:r>
+              <a:rPr lang="en-US" dirty="0"/>
+              <a:t>All technical metrics i.e. critical load interruptions, energy fulfilment and load shedding are excellent.</a:t>
+            </a:r>
+          </a:p>
+          <a:p>
+            <a:pPr marL="285750" indent="-285750">
+              <a:spcAft>
+                <a:spcPts val="600"/>
+              </a:spcAft>
+              <a:buFontTx/>
+              <a:buChar char="-"/>
+            </a:pPr>
+            <a:r>
+              <a:rPr lang="en-US" dirty="0"/>
+              <a:t>However, the unit costs in early years are high as installing the full capacity from the beginning leads to overcapacity.</a:t>
+            </a:r>
+          </a:p>
+        </p:txBody>
+      </p:sp>
+      <p:pic>
+        <p:nvPicPr>
+          <p:cNvPr id="3" name="Picture 2">
+            <a:extLst>
+              <a:ext uri="{FF2B5EF4-FFF2-40B4-BE49-F238E27FC236}">
+                <a16:creationId xmlns:a16="http://schemas.microsoft.com/office/drawing/2014/main" id="{12870D40-C99C-F30F-C1A0-249464D3AD90}"/>
+              </a:ext>
+            </a:extLst>
+          </p:cNvPr>
+          <p:cNvPicPr>
+            <a:picLocks noChangeAspect="1"/>
+          </p:cNvPicPr>
+          <p:nvPr/>
+        </p:nvPicPr>
+        <p:blipFill rotWithShape="1">
+          <a:blip r:embed="rId2"/>
+          <a:srcRect/>
+          <a:stretch/>
+        </p:blipFill>
+        <p:spPr>
+          <a:xfrm>
+            <a:off x="432547" y="1544172"/>
+            <a:ext cx="8427685" cy="4201150"/>
+          </a:xfrm>
+          <a:prstGeom prst="rect">
+            <a:avLst/>
+          </a:prstGeom>
+        </p:spPr>
+      </p:pic>
+    </p:spTree>
+    <p:extLst>
+      <p:ext uri="{BB962C8B-B14F-4D97-AF65-F5344CB8AC3E}">
+        <p14:creationId xmlns:p14="http://schemas.microsoft.com/office/powerpoint/2010/main" val="3921020223"/>
+      </p:ext>
+    </p:extLst>
+  </p:cSld>
+  <p:clrMapOvr>
+    <a:masterClrMapping/>
+  </p:clrMapOvr>
+</p:sld>
+</file>
+
+<file path=ppt/slides/slide27.xml><?xml version="1.0" encoding="utf-8"?>
+<p:sld xmlns:a="http://schemas.openxmlformats.org/drawingml/2006/main" xmlns:r="http://schemas.openxmlformats.org/officeDocument/2006/relationships" xmlns:p="http://schemas.openxmlformats.org/presentationml/2006/main">
+  <p:cSld>
+    <p:spTree>
+      <p:nvGrpSpPr>
+        <p:cNvPr id="1" name=""/>
+        <p:cNvGrpSpPr/>
+        <p:nvPr/>
+      </p:nvGrpSpPr>
+      <p:grpSpPr>
+        <a:xfrm>
+          <a:off x="0" y="0"/>
+          <a:ext cx="0" cy="0"/>
+          <a:chOff x="0" y="0"/>
+          <a:chExt cx="0" cy="0"/>
+        </a:xfrm>
+      </p:grpSpPr>
+      <p:sp>
+        <p:nvSpPr>
+          <p:cNvPr id="8" name="Rectangle 7">
+            <a:extLst>
+              <a:ext uri="{FF2B5EF4-FFF2-40B4-BE49-F238E27FC236}">
+                <a16:creationId xmlns:a16="http://schemas.microsoft.com/office/drawing/2014/main" id="{3B19791E-7559-E149-CC7A-4A3B0F837C0C}"/>
+              </a:ext>
+            </a:extLst>
+          </p:cNvPr>
+          <p:cNvSpPr/>
+          <p:nvPr/>
+        </p:nvSpPr>
+        <p:spPr>
+          <a:xfrm>
+            <a:off x="339376" y="485499"/>
+            <a:ext cx="8664924" cy="646331"/>
+          </a:xfrm>
+          <a:prstGeom prst="rect">
+            <a:avLst/>
+          </a:prstGeom>
+          <a:noFill/>
+        </p:spPr>
+        <p:txBody>
+          <a:bodyPr wrap="square" lIns="91440" tIns="45720" rIns="91440" bIns="45720">
+            <a:spAutoFit/>
+          </a:bodyPr>
+          <a:lstStyle/>
+          <a:p>
+            <a:r>
+              <a:rPr lang="en-US" sz="3600" b="1" cap="none" spc="0" dirty="0">
+                <a:ln w="0"/>
+                <a:solidFill>
+                  <a:srgbClr val="44546A"/>
+                </a:solidFill>
+                <a:effectLst>
+                  <a:outerShdw blurRad="38100" dist="19050" dir="2700000" algn="tl" rotWithShape="0">
+                    <a:schemeClr val="dk1">
+                      <a:alpha val="40000"/>
+                    </a:schemeClr>
+                  </a:outerShdw>
+                </a:effectLst>
+                <a:latin typeface="+mj-lt"/>
+              </a:rPr>
+              <a:t>Scenario </a:t>
+            </a:r>
+            <a:r>
+              <a:rPr lang="en-US" sz="3600" b="1" dirty="0">
+                <a:ln w="0"/>
+                <a:solidFill>
+                  <a:srgbClr val="44546A"/>
+                </a:solidFill>
+                <a:effectLst>
+                  <a:outerShdw blurRad="38100" dist="19050" dir="2700000" algn="tl" rotWithShape="0">
+                    <a:schemeClr val="dk1">
+                      <a:alpha val="40000"/>
+                    </a:schemeClr>
+                  </a:outerShdw>
+                </a:effectLst>
+                <a:latin typeface="+mj-lt"/>
+              </a:rPr>
+              <a:t>2: Analysis of Over-capacity  </a:t>
+            </a:r>
+            <a:endParaRPr lang="en-US" sz="3600" b="1" cap="none" spc="0" dirty="0">
+              <a:ln w="0"/>
+              <a:solidFill>
+                <a:srgbClr val="44546A"/>
+              </a:solidFill>
+              <a:effectLst>
+                <a:outerShdw blurRad="38100" dist="19050" dir="2700000" algn="tl" rotWithShape="0">
+                  <a:schemeClr val="dk1">
+                    <a:alpha val="40000"/>
+                  </a:schemeClr>
+                </a:outerShdw>
+              </a:effectLst>
+              <a:latin typeface="+mj-lt"/>
+            </a:endParaRPr>
+          </a:p>
+        </p:txBody>
+      </p:sp>
+      <p:sp>
+        <p:nvSpPr>
+          <p:cNvPr id="11" name="TextBox 10">
+            <a:extLst>
+              <a:ext uri="{FF2B5EF4-FFF2-40B4-BE49-F238E27FC236}">
+                <a16:creationId xmlns:a16="http://schemas.microsoft.com/office/drawing/2014/main" id="{4E8298CA-C516-E735-DA20-BE1A45F50CA4}"/>
+              </a:ext>
+            </a:extLst>
+          </p:cNvPr>
+          <p:cNvSpPr txBox="1"/>
+          <p:nvPr/>
+        </p:nvSpPr>
+        <p:spPr>
+          <a:xfrm>
+            <a:off x="8255000" y="1131829"/>
+            <a:ext cx="3597624" cy="5309146"/>
+          </a:xfrm>
+          <a:prstGeom prst="rect">
+            <a:avLst/>
+          </a:prstGeom>
+          <a:noFill/>
+          <a:ln>
+            <a:solidFill>
+              <a:schemeClr val="accent2"/>
+            </a:solidFill>
+          </a:ln>
+        </p:spPr>
+        <p:txBody>
+          <a:bodyPr wrap="square" rtlCol="0">
+            <a:spAutoFit/>
+          </a:bodyPr>
+          <a:lstStyle/>
+          <a:p>
+            <a:pPr marL="285750" indent="-285750">
+              <a:spcAft>
+                <a:spcPts val="600"/>
+              </a:spcAft>
+              <a:buFontTx/>
+              <a:buChar char="-"/>
+            </a:pPr>
+            <a:r>
+              <a:rPr lang="en-US" dirty="0"/>
+              <a:t>Orange lines illustrate the extra capacity due to which the total costs in Years 1 and 2 are 92% of Year 12 cost, due the demand is less than 75%.</a:t>
+            </a:r>
+          </a:p>
+          <a:p>
+            <a:pPr marL="285750" indent="-285750">
+              <a:spcAft>
+                <a:spcPts val="600"/>
+              </a:spcAft>
+              <a:buFontTx/>
+              <a:buChar char="-"/>
+            </a:pPr>
+            <a:r>
+              <a:rPr lang="en-US" dirty="0"/>
+              <a:t>We can see that significant difference between energy requirement and costs proportions remain up till year 7.</a:t>
+            </a:r>
+          </a:p>
+          <a:p>
+            <a:pPr marL="285750" indent="-285750">
+              <a:spcAft>
+                <a:spcPts val="600"/>
+              </a:spcAft>
+              <a:buFontTx/>
+              <a:buChar char="-"/>
+            </a:pPr>
+            <a:r>
+              <a:rPr lang="en-US" dirty="0"/>
+              <a:t>This indicates the need to install new PV and BESS in a phased manner that aligns with the projected energy demand increase over the years.</a:t>
+            </a:r>
+          </a:p>
+          <a:p>
+            <a:pPr marL="285750" indent="-285750">
+              <a:spcAft>
+                <a:spcPts val="600"/>
+              </a:spcAft>
+              <a:buFontTx/>
+              <a:buChar char="-"/>
+            </a:pPr>
+            <a:r>
+              <a:rPr lang="en-US" b="1" dirty="0"/>
+              <a:t>Scenario 3 implements configuration adopted in Scenario 2 but in a phase manner.</a:t>
+            </a:r>
+          </a:p>
+        </p:txBody>
+      </p:sp>
+      <p:pic>
+        <p:nvPicPr>
+          <p:cNvPr id="6" name="Picture 5">
+            <a:extLst>
+              <a:ext uri="{FF2B5EF4-FFF2-40B4-BE49-F238E27FC236}">
+                <a16:creationId xmlns:a16="http://schemas.microsoft.com/office/drawing/2014/main" id="{4D540B42-F964-A7F6-47B8-1D91E3935F1C}"/>
+              </a:ext>
+            </a:extLst>
+          </p:cNvPr>
+          <p:cNvPicPr>
+            <a:picLocks noChangeAspect="1"/>
+          </p:cNvPicPr>
+          <p:nvPr/>
+        </p:nvPicPr>
+        <p:blipFill>
+          <a:blip r:embed="rId2"/>
+          <a:stretch>
+            <a:fillRect/>
+          </a:stretch>
+        </p:blipFill>
+        <p:spPr>
+          <a:xfrm>
+            <a:off x="533399" y="1131829"/>
+            <a:ext cx="7375759" cy="5240671"/>
+          </a:xfrm>
+          <a:prstGeom prst="rect">
+            <a:avLst/>
+          </a:prstGeom>
+        </p:spPr>
+      </p:pic>
+    </p:spTree>
+    <p:extLst>
+      <p:ext uri="{BB962C8B-B14F-4D97-AF65-F5344CB8AC3E}">
+        <p14:creationId xmlns:p14="http://schemas.microsoft.com/office/powerpoint/2010/main" val="779039475"/>
+      </p:ext>
+    </p:extLst>
+  </p:cSld>
+  <p:clrMapOvr>
+    <a:masterClrMapping/>
+  </p:clrMapOvr>
+</p:sld>
+</file>
+
+<file path=ppt/slides/slide28.xml><?xml version="1.0" encoding="utf-8"?>
+<p:sld xmlns:a="http://schemas.openxmlformats.org/drawingml/2006/main" xmlns:r="http://schemas.openxmlformats.org/officeDocument/2006/relationships" xmlns:p="http://schemas.openxmlformats.org/presentationml/2006/main">
+  <p:cSld>
+    <p:spTree>
+      <p:nvGrpSpPr>
+        <p:cNvPr id="1" name=""/>
+        <p:cNvGrpSpPr/>
+        <p:nvPr/>
+      </p:nvGrpSpPr>
+      <p:grpSpPr>
+        <a:xfrm>
+          <a:off x="0" y="0"/>
+          <a:ext cx="0" cy="0"/>
+          <a:chOff x="0" y="0"/>
+          <a:chExt cx="0" cy="0"/>
+        </a:xfrm>
+      </p:grpSpPr>
+      <p:sp>
+        <p:nvSpPr>
+          <p:cNvPr id="8" name="Rectangle 7">
+            <a:extLst>
+              <a:ext uri="{FF2B5EF4-FFF2-40B4-BE49-F238E27FC236}">
+                <a16:creationId xmlns:a16="http://schemas.microsoft.com/office/drawing/2014/main" id="{3B19791E-7559-E149-CC7A-4A3B0F837C0C}"/>
+              </a:ext>
+            </a:extLst>
+          </p:cNvPr>
+          <p:cNvSpPr/>
+          <p:nvPr/>
+        </p:nvSpPr>
+        <p:spPr>
+          <a:xfrm>
+            <a:off x="339376" y="485499"/>
+            <a:ext cx="7273250" cy="646331"/>
+          </a:xfrm>
+          <a:prstGeom prst="rect">
+            <a:avLst/>
+          </a:prstGeom>
+          <a:noFill/>
+        </p:spPr>
+        <p:txBody>
+          <a:bodyPr wrap="square" lIns="91440" tIns="45720" rIns="91440" bIns="45720">
+            <a:spAutoFit/>
+          </a:bodyPr>
+          <a:lstStyle/>
+          <a:p>
+            <a:r>
+              <a:rPr lang="en-US" sz="3600" b="1" cap="none" spc="0" dirty="0">
+                <a:ln w="0"/>
+                <a:solidFill>
+                  <a:srgbClr val="44546A"/>
+                </a:solidFill>
+                <a:effectLst>
+                  <a:outerShdw blurRad="38100" dist="19050" dir="2700000" algn="tl" rotWithShape="0">
+                    <a:schemeClr val="dk1">
+                      <a:alpha val="40000"/>
+                    </a:schemeClr>
+                  </a:outerShdw>
+                </a:effectLst>
+                <a:latin typeface="+mj-lt"/>
+              </a:rPr>
+              <a:t>Scenario 3: Configuration</a:t>
+            </a:r>
+          </a:p>
+        </p:txBody>
+      </p:sp>
+      <p:graphicFrame>
+        <p:nvGraphicFramePr>
+          <p:cNvPr id="4" name="Table 3">
+            <a:extLst>
+              <a:ext uri="{FF2B5EF4-FFF2-40B4-BE49-F238E27FC236}">
+                <a16:creationId xmlns:a16="http://schemas.microsoft.com/office/drawing/2014/main" id="{4D10EE2A-787F-7494-5A47-B2C352ED3BEF}"/>
+              </a:ext>
+            </a:extLst>
+          </p:cNvPr>
+          <p:cNvGraphicFramePr>
+            <a:graphicFrameLocks noGrp="1"/>
+          </p:cNvGraphicFramePr>
+          <p:nvPr>
+            <p:extLst>
+              <p:ext uri="{D42A27DB-BD31-4B8C-83A1-F6EECF244321}">
+                <p14:modId xmlns:p14="http://schemas.microsoft.com/office/powerpoint/2010/main" val="3940350356"/>
+              </p:ext>
+            </p:extLst>
+          </p:nvPr>
+        </p:nvGraphicFramePr>
+        <p:xfrm>
+          <a:off x="1714500" y="1468120"/>
+          <a:ext cx="8077200" cy="4572000"/>
+        </p:xfrm>
+        <a:graphic>
+          <a:graphicData uri="http://schemas.openxmlformats.org/drawingml/2006/table">
+            <a:tbl>
+              <a:tblPr firstRow="1" bandRow="1">
+                <a:tableStyleId>{5C22544A-7EE6-4342-B048-85BDC9FD1C3A}</a:tableStyleId>
+              </a:tblPr>
+              <a:tblGrid>
+                <a:gridCol w="2777067">
+                  <a:extLst>
+                    <a:ext uri="{9D8B030D-6E8A-4147-A177-3AD203B41FA5}">
+                      <a16:colId xmlns:a16="http://schemas.microsoft.com/office/drawing/2014/main" val="3970483884"/>
+                    </a:ext>
+                  </a:extLst>
+                </a:gridCol>
+                <a:gridCol w="3585633">
+                  <a:extLst>
+                    <a:ext uri="{9D8B030D-6E8A-4147-A177-3AD203B41FA5}">
+                      <a16:colId xmlns:a16="http://schemas.microsoft.com/office/drawing/2014/main" val="2222360701"/>
+                    </a:ext>
+                  </a:extLst>
+                </a:gridCol>
+                <a:gridCol w="1714500">
+                  <a:extLst>
+                    <a:ext uri="{9D8B030D-6E8A-4147-A177-3AD203B41FA5}">
+                      <a16:colId xmlns:a16="http://schemas.microsoft.com/office/drawing/2014/main" val="246716077"/>
+                    </a:ext>
+                  </a:extLst>
+                </a:gridCol>
+              </a:tblGrid>
+              <a:tr h="510822">
+                <a:tc>
+                  <a:txBody>
+                    <a:bodyPr/>
+                    <a:lstStyle/>
+                    <a:p>
+                      <a:pPr lvl="0"/>
+                      <a:r>
+                        <a:rPr lang="en-US" dirty="0"/>
+                        <a:t>Source</a:t>
+                      </a:r>
+                    </a:p>
+                  </a:txBody>
+                  <a:tcPr/>
+                </a:tc>
+                <a:tc>
+                  <a:txBody>
+                    <a:bodyPr/>
+                    <a:lstStyle/>
+                    <a:p>
+                      <a:r>
+                        <a:rPr lang="en-US" dirty="0"/>
+                        <a:t>Configuration/ Role</a:t>
+                      </a:r>
+                    </a:p>
+                  </a:txBody>
+                  <a:tcPr/>
+                </a:tc>
+                <a:tc>
+                  <a:txBody>
+                    <a:bodyPr/>
+                    <a:lstStyle/>
+                    <a:p>
+                      <a:pPr algn="ctr"/>
+                      <a:r>
+                        <a:rPr lang="en-US" dirty="0"/>
+                        <a:t>Priority in Meeting Demand</a:t>
+                      </a:r>
+                    </a:p>
+                  </a:txBody>
+                  <a:tcPr/>
+                </a:tc>
+                <a:extLst>
+                  <a:ext uri="{0D108BD9-81ED-4DB2-BD59-A6C34878D82A}">
+                    <a16:rowId xmlns:a16="http://schemas.microsoft.com/office/drawing/2014/main" val="386839934"/>
+                  </a:ext>
+                </a:extLst>
+              </a:tr>
+              <a:tr h="510822">
+                <a:tc>
+                  <a:txBody>
+                    <a:bodyPr/>
+                    <a:lstStyle/>
+                    <a:p>
+                      <a:pPr lvl="0"/>
+                      <a:r>
+                        <a:rPr lang="en-US" dirty="0"/>
+                        <a:t>Existing 5MW Solar PPA</a:t>
+                      </a:r>
+                    </a:p>
+                  </a:txBody>
+                  <a:tcPr anchor="ctr"/>
+                </a:tc>
+                <a:tc>
+                  <a:txBody>
+                    <a:bodyPr/>
+                    <a:lstStyle/>
+                    <a:p>
+                      <a:r>
+                        <a:rPr lang="en-US" dirty="0"/>
+                        <a:t>Operates from Year 1 to 12 as primary source</a:t>
+                      </a:r>
+                    </a:p>
+                  </a:txBody>
+                  <a:tcPr anchor="ctr"/>
+                </a:tc>
+                <a:tc>
+                  <a:txBody>
+                    <a:bodyPr/>
+                    <a:lstStyle/>
+                    <a:p>
+                      <a:pPr algn="ctr"/>
+                      <a:r>
+                        <a:rPr lang="en-US" sz="2400" dirty="0"/>
+                        <a:t>1</a:t>
+                      </a:r>
+                    </a:p>
+                  </a:txBody>
+                  <a:tcPr anchor="ctr"/>
+                </a:tc>
+                <a:extLst>
+                  <a:ext uri="{0D108BD9-81ED-4DB2-BD59-A6C34878D82A}">
+                    <a16:rowId xmlns:a16="http://schemas.microsoft.com/office/drawing/2014/main" val="3327692913"/>
+                  </a:ext>
+                </a:extLst>
+              </a:tr>
+              <a:tr h="634154">
+                <a:tc>
+                  <a:txBody>
+                    <a:bodyPr/>
+                    <a:lstStyle/>
+                    <a:p>
+                      <a:pPr lvl="0"/>
+                      <a:r>
+                        <a:rPr lang="en-US" dirty="0"/>
+                        <a:t>Existing Diesel Generators</a:t>
+                      </a:r>
+                    </a:p>
+                  </a:txBody>
+                  <a:tcPr anchor="ctr"/>
+                </a:tc>
+                <a:tc>
+                  <a:txBody>
+                    <a:bodyPr/>
+                    <a:lstStyle/>
+                    <a:p>
+                      <a:r>
+                        <a:rPr lang="en-US" dirty="0"/>
+                        <a:t>6 x 1.5 MW operate from Year 1 to 12 as backup source</a:t>
+                      </a:r>
+                    </a:p>
+                  </a:txBody>
+                  <a:tcPr anchor="ctr"/>
+                </a:tc>
+                <a:tc>
+                  <a:txBody>
+                    <a:bodyPr/>
+                    <a:lstStyle/>
+                    <a:p>
+                      <a:pPr algn="ctr"/>
+                      <a:r>
+                        <a:rPr lang="en-US" sz="2400" dirty="0"/>
+                        <a:t>3</a:t>
+                      </a:r>
+                    </a:p>
+                  </a:txBody>
+                  <a:tcPr anchor="ctr"/>
+                </a:tc>
+                <a:extLst>
+                  <a:ext uri="{0D108BD9-81ED-4DB2-BD59-A6C34878D82A}">
+                    <a16:rowId xmlns:a16="http://schemas.microsoft.com/office/drawing/2014/main" val="2140261716"/>
+                  </a:ext>
+                </a:extLst>
+              </a:tr>
+              <a:tr h="647700">
+                <a:tc>
+                  <a:txBody>
+                    <a:bodyPr/>
+                    <a:lstStyle/>
+                    <a:p>
+                      <a:pPr lvl="0"/>
+                      <a:r>
+                        <a:rPr lang="en-US" dirty="0"/>
+                        <a:t>New Solar PPA</a:t>
+                      </a:r>
+                    </a:p>
+                  </a:txBody>
+                  <a:tcPr anchor="ctr"/>
+                </a:tc>
+                <a:tc>
+                  <a:txBody>
+                    <a:bodyPr/>
+                    <a:lstStyle/>
+                    <a:p>
+                      <a:r>
+                        <a:rPr lang="en-US" dirty="0"/>
+                        <a:t>40 MW added in Year 1, then 5MW each in Years 3, 5 and 8. All to operate till Year 12 and beyond as primary source</a:t>
+                      </a:r>
+                    </a:p>
+                  </a:txBody>
+                  <a:tcPr anchor="ctr"/>
+                </a:tc>
+                <a:tc>
+                  <a:txBody>
+                    <a:bodyPr/>
+                    <a:lstStyle/>
+                    <a:p>
+                      <a:pPr algn="ctr"/>
+                      <a:r>
+                        <a:rPr lang="en-US" sz="2400" dirty="0"/>
+                        <a:t>1</a:t>
+                      </a:r>
+                    </a:p>
+                  </a:txBody>
+                  <a:tcPr anchor="ctr"/>
+                </a:tc>
+                <a:extLst>
+                  <a:ext uri="{0D108BD9-81ED-4DB2-BD59-A6C34878D82A}">
+                    <a16:rowId xmlns:a16="http://schemas.microsoft.com/office/drawing/2014/main" val="3250094683"/>
+                  </a:ext>
+                </a:extLst>
+              </a:tr>
+              <a:tr h="647700">
+                <a:tc>
+                  <a:txBody>
+                    <a:bodyPr/>
+                    <a:lstStyle/>
+                    <a:p>
+                      <a:pPr lvl="0"/>
+                      <a:r>
+                        <a:rPr lang="en-US" dirty="0"/>
+                        <a:t>New BESS PPA</a:t>
+                      </a:r>
+                    </a:p>
+                  </a:txBody>
+                  <a:tcPr anchor="ctr"/>
+                </a:tc>
+                <a:tc>
+                  <a:txBody>
+                    <a:bodyPr/>
+                    <a:lstStyle/>
+                    <a:p>
+                      <a:r>
+                        <a:rPr lang="en-US" dirty="0"/>
+                        <a:t>60 MWh added in Year 1, then 5MWh in Year 3; 10MWh in Years 5, 8, 10. All to operate till Year 12 and beyond.</a:t>
+                      </a:r>
+                    </a:p>
+                  </a:txBody>
+                  <a:tcPr anchor="ctr"/>
+                </a:tc>
+                <a:tc>
+                  <a:txBody>
+                    <a:bodyPr/>
+                    <a:lstStyle/>
+                    <a:p>
+                      <a:pPr algn="ctr"/>
+                      <a:r>
+                        <a:rPr lang="en-US" sz="2400" dirty="0"/>
+                        <a:t>2</a:t>
+                      </a:r>
+                    </a:p>
+                  </a:txBody>
+                  <a:tcPr anchor="ctr"/>
+                </a:tc>
+                <a:extLst>
+                  <a:ext uri="{0D108BD9-81ED-4DB2-BD59-A6C34878D82A}">
+                    <a16:rowId xmlns:a16="http://schemas.microsoft.com/office/drawing/2014/main" val="386059280"/>
+                  </a:ext>
+                </a:extLst>
+              </a:tr>
+            </a:tbl>
+          </a:graphicData>
+        </a:graphic>
+      </p:graphicFrame>
+    </p:spTree>
+    <p:extLst>
+      <p:ext uri="{BB962C8B-B14F-4D97-AF65-F5344CB8AC3E}">
+        <p14:creationId xmlns:p14="http://schemas.microsoft.com/office/powerpoint/2010/main" val="4106584752"/>
+      </p:ext>
+    </p:extLst>
+  </p:cSld>
+  <p:clrMapOvr>
+    <a:masterClrMapping/>
+  </p:clrMapOvr>
+</p:sld>
+</file>
+
+<file path=ppt/slides/slide29.xml><?xml version="1.0" encoding="utf-8"?>
+<p:sld xmlns:a="http://schemas.openxmlformats.org/drawingml/2006/main" xmlns:r="http://schemas.openxmlformats.org/officeDocument/2006/relationships" xmlns:p="http://schemas.openxmlformats.org/presentationml/2006/main">
+  <p:cSld>
+    <p:spTree>
+      <p:nvGrpSpPr>
+        <p:cNvPr id="1" name=""/>
+        <p:cNvGrpSpPr/>
+        <p:nvPr/>
+      </p:nvGrpSpPr>
+      <p:grpSpPr>
+        <a:xfrm>
+          <a:off x="0" y="0"/>
+          <a:ext cx="0" cy="0"/>
+          <a:chOff x="0" y="0"/>
+          <a:chExt cx="0" cy="0"/>
+        </a:xfrm>
+      </p:grpSpPr>
+      <p:sp>
+        <p:nvSpPr>
+          <p:cNvPr id="7" name="Rectangle 6"/>
+          <p:cNvSpPr/>
+          <p:nvPr/>
+        </p:nvSpPr>
+        <p:spPr>
+          <a:xfrm>
+            <a:off x="263176" y="485499"/>
+            <a:ext cx="7273250" cy="646331"/>
+          </a:xfrm>
+          <a:prstGeom prst="rect">
+            <a:avLst/>
+          </a:prstGeom>
+          <a:noFill/>
+        </p:spPr>
+        <p:txBody>
+          <a:bodyPr wrap="square" lIns="91440" tIns="45720" rIns="91440" bIns="45720">
+            <a:spAutoFit/>
+          </a:bodyPr>
+          <a:lstStyle/>
+          <a:p>
+            <a:r>
+              <a:rPr lang="en-US" sz="3600" b="1" cap="none" spc="0" dirty="0">
+                <a:ln w="0"/>
+                <a:solidFill>
+                  <a:srgbClr val="44546A"/>
+                </a:solidFill>
+                <a:effectLst>
+                  <a:outerShdw blurRad="38100" dist="19050" dir="2700000" algn="tl" rotWithShape="0">
+                    <a:schemeClr val="dk1">
+                      <a:alpha val="40000"/>
+                    </a:schemeClr>
+                  </a:outerShdw>
+                </a:effectLst>
+                <a:latin typeface="+mj-lt"/>
+              </a:rPr>
+              <a:t>Scenario 3: Summary</a:t>
+            </a:r>
+          </a:p>
+        </p:txBody>
+      </p:sp>
+      <p:pic>
+        <p:nvPicPr>
+          <p:cNvPr id="5" name="Picture 4">
+            <a:extLst>
+              <a:ext uri="{FF2B5EF4-FFF2-40B4-BE49-F238E27FC236}">
+                <a16:creationId xmlns:a16="http://schemas.microsoft.com/office/drawing/2014/main" id="{071C777D-64DF-1C7B-77A1-29F8272DE625}"/>
+              </a:ext>
+            </a:extLst>
+          </p:cNvPr>
+          <p:cNvPicPr>
+            <a:picLocks noChangeAspect="1"/>
+          </p:cNvPicPr>
+          <p:nvPr/>
+        </p:nvPicPr>
+        <p:blipFill>
+          <a:blip r:embed="rId3"/>
+          <a:stretch>
+            <a:fillRect/>
+          </a:stretch>
+        </p:blipFill>
+        <p:spPr>
+          <a:xfrm>
+            <a:off x="1935162" y="1436745"/>
+            <a:ext cx="8112918" cy="4265555"/>
+          </a:xfrm>
+          <a:prstGeom prst="rect">
+            <a:avLst/>
+          </a:prstGeom>
+        </p:spPr>
+      </p:pic>
+    </p:spTree>
+    <p:extLst>
+      <p:ext uri="{BB962C8B-B14F-4D97-AF65-F5344CB8AC3E}">
+        <p14:creationId xmlns:p14="http://schemas.microsoft.com/office/powerpoint/2010/main" val="2152358598"/>
+      </p:ext>
+    </p:extLst>
+  </p:cSld>
+  <p:clrMapOvr>
+    <a:masterClrMapping/>
+  </p:clrMapOvr>
+</p:sld>
+</file>
+
+<file path=ppt/slides/slide3.xml><?xml version="1.0" encoding="utf-8"?>
+<p:sld xmlns:a="http://schemas.openxmlformats.org/drawingml/2006/main" xmlns:r="http://schemas.openxmlformats.org/officeDocument/2006/relationships" xmlns:p="http://schemas.openxmlformats.org/presentationml/2006/main">
+  <p:cSld>
+    <p:spTree>
+      <p:nvGrpSpPr>
+        <p:cNvPr id="1" name=""/>
+        <p:cNvGrpSpPr/>
+        <p:nvPr/>
+      </p:nvGrpSpPr>
+      <p:grpSpPr>
+        <a:xfrm>
+          <a:off x="0" y="0"/>
+          <a:ext cx="0" cy="0"/>
+          <a:chOff x="0" y="0"/>
+          <a:chExt cx="0" cy="0"/>
+        </a:xfrm>
+      </p:grpSpPr>
+      <p:pic>
+        <p:nvPicPr>
+          <p:cNvPr id="4" name="Picture 3"/>
+          <p:cNvPicPr>
+            <a:picLocks noChangeAspect="1"/>
+          </p:cNvPicPr>
+          <p:nvPr/>
+        </p:nvPicPr>
+        <p:blipFill rotWithShape="1">
+          <a:blip r:embed="rId2" cstate="print">
+            <a:extLst>
+              <a:ext uri="{28A0092B-C50C-407E-A947-70E740481C1C}">
+                <a14:useLocalDpi xmlns:a14="http://schemas.microsoft.com/office/drawing/2010/main" val="0"/>
+              </a:ext>
+            </a:extLst>
+          </a:blip>
+          <a:srcRect l="12651" t="21159" r="61776" b="20703"/>
+          <a:stretch/>
+        </p:blipFill>
+        <p:spPr>
+          <a:xfrm>
+            <a:off x="11109277" y="114597"/>
+            <a:ext cx="951221" cy="981561"/>
+          </a:xfrm>
+          <a:prstGeom prst="rect">
+            <a:avLst/>
+          </a:prstGeom>
+        </p:spPr>
+      </p:pic>
+      <p:sp>
+        <p:nvSpPr>
+          <p:cNvPr id="9" name="Title 1">
+            <a:extLst>
+              <a:ext uri="{FF2B5EF4-FFF2-40B4-BE49-F238E27FC236}">
+                <a16:creationId xmlns:a16="http://schemas.microsoft.com/office/drawing/2014/main" id="{3B6556A0-5D81-7C5E-D3AE-660B3A863943}"/>
+              </a:ext>
+            </a:extLst>
+          </p:cNvPr>
+          <p:cNvSpPr>
+            <a:spLocks noGrp="1"/>
+          </p:cNvSpPr>
+          <p:nvPr>
+            <p:ph type="title"/>
+          </p:nvPr>
+        </p:nvSpPr>
+        <p:spPr>
+          <a:xfrm>
+            <a:off x="838200" y="234590"/>
+            <a:ext cx="10515600" cy="861568"/>
+          </a:xfrm>
+        </p:spPr>
+        <p:txBody>
+          <a:bodyPr vert="horz" lIns="91440" tIns="45720" rIns="91440" bIns="45720" rtlCol="0" anchor="ctr">
+            <a:normAutofit/>
+          </a:bodyPr>
+          <a:lstStyle/>
+          <a:p>
+            <a:r>
+              <a:rPr lang="en-US" sz="5400" b="1" dirty="0">
+                <a:solidFill>
+                  <a:srgbClr val="44546A"/>
+                </a:solidFill>
+              </a:rPr>
+              <a:t>Load Projection</a:t>
+            </a:r>
+          </a:p>
+        </p:txBody>
+      </p:sp>
+      <p:graphicFrame>
+        <p:nvGraphicFramePr>
+          <p:cNvPr id="2" name="Chart 1">
+            <a:extLst>
+              <a:ext uri="{FF2B5EF4-FFF2-40B4-BE49-F238E27FC236}">
+                <a16:creationId xmlns:a16="http://schemas.microsoft.com/office/drawing/2014/main" id="{B945382A-B513-1151-94F1-434C98813EAC}"/>
+              </a:ext>
+            </a:extLst>
+          </p:cNvPr>
+          <p:cNvGraphicFramePr>
+            <a:graphicFrameLocks/>
+          </p:cNvGraphicFramePr>
+          <p:nvPr>
+            <p:extLst>
+              <p:ext uri="{D42A27DB-BD31-4B8C-83A1-F6EECF244321}">
+                <p14:modId xmlns:p14="http://schemas.microsoft.com/office/powerpoint/2010/main" val="379220896"/>
+              </p:ext>
+            </p:extLst>
+          </p:nvPr>
+        </p:nvGraphicFramePr>
+        <p:xfrm>
+          <a:off x="1298448" y="1255039"/>
+          <a:ext cx="9595104" cy="4456527"/>
+        </p:xfrm>
+        <a:graphic>
+          <a:graphicData uri="http://schemas.openxmlformats.org/drawingml/2006/chart">
+            <c:chart xmlns:c="http://schemas.openxmlformats.org/drawingml/2006/chart" xmlns:r="http://schemas.openxmlformats.org/officeDocument/2006/relationships" r:id="rId3"/>
+          </a:graphicData>
+        </a:graphic>
+      </p:graphicFrame>
+      <p:sp>
+        <p:nvSpPr>
+          <p:cNvPr id="3" name="Content Placeholder 3">
+            <a:extLst>
+              <a:ext uri="{FF2B5EF4-FFF2-40B4-BE49-F238E27FC236}">
+                <a16:creationId xmlns:a16="http://schemas.microsoft.com/office/drawing/2014/main" id="{55EA12DF-1B4A-C724-40B2-B05DD1686164}"/>
+              </a:ext>
+            </a:extLst>
+          </p:cNvPr>
+          <p:cNvSpPr>
+            <a:spLocks noGrp="1"/>
+          </p:cNvSpPr>
+          <p:nvPr>
+            <p:ph idx="1"/>
+          </p:nvPr>
+        </p:nvSpPr>
+        <p:spPr>
+          <a:xfrm>
+            <a:off x="1298448" y="5870447"/>
+            <a:ext cx="9810829" cy="571295"/>
+          </a:xfrm>
+        </p:spPr>
+        <p:txBody>
+          <a:bodyPr>
+            <a:normAutofit fontScale="92500" lnSpcReduction="10000"/>
+          </a:bodyPr>
+          <a:lstStyle/>
+          <a:p>
+            <a:pPr marL="0" indent="0">
+              <a:buNone/>
+            </a:pPr>
+            <a:r>
+              <a:rPr lang="en-US" sz="2000" i="1" dirty="0"/>
+              <a:t>The above load projection as well as hourly load data was combined to form hourly load projections over 12 years.</a:t>
+            </a:r>
+          </a:p>
+        </p:txBody>
+      </p:sp>
+    </p:spTree>
+    <p:extLst>
+      <p:ext uri="{BB962C8B-B14F-4D97-AF65-F5344CB8AC3E}">
+        <p14:creationId xmlns:p14="http://schemas.microsoft.com/office/powerpoint/2010/main" val="1481723967"/>
+      </p:ext>
+    </p:extLst>
+  </p:cSld>
+  <p:clrMapOvr>
+    <a:masterClrMapping/>
+  </p:clrMapOvr>
+</p:sld>
+</file>
+
+<file path=ppt/slides/slide30.xml><?xml version="1.0" encoding="utf-8"?>
+<p:sld xmlns:a="http://schemas.openxmlformats.org/drawingml/2006/main" xmlns:r="http://schemas.openxmlformats.org/officeDocument/2006/relationships" xmlns:p="http://schemas.openxmlformats.org/presentationml/2006/main">
+  <p:cSld>
+    <p:spTree>
+      <p:nvGrpSpPr>
+        <p:cNvPr id="1" name=""/>
+        <p:cNvGrpSpPr/>
+        <p:nvPr/>
+      </p:nvGrpSpPr>
+      <p:grpSpPr>
+        <a:xfrm>
+          <a:off x="0" y="0"/>
+          <a:ext cx="0" cy="0"/>
+          <a:chOff x="0" y="0"/>
+          <a:chExt cx="0" cy="0"/>
+        </a:xfrm>
+      </p:grpSpPr>
+      <p:sp>
+        <p:nvSpPr>
+          <p:cNvPr id="7" name="Rectangle 6"/>
+          <p:cNvSpPr/>
+          <p:nvPr/>
+        </p:nvSpPr>
+        <p:spPr>
+          <a:xfrm>
             <a:off x="428625" y="447399"/>
             <a:ext cx="7273250" cy="646331"/>
           </a:xfrm>
@@ -30159,7 +33168,7 @@
                 </a:effectLst>
                 <a:latin typeface="+mj-lt"/>
               </a:rPr>
-              <a:t>Scenario 1: Summary</a:t>
+              <a:t>Scenario 3: Summary</a:t>
             </a:r>
           </a:p>
         </p:txBody>
@@ -30237,7 +33246,7 @@
 </p:sld>
 </file>
 
-<file path=ppt/slides/slide21.xml><?xml version="1.0" encoding="utf-8"?>
+<file path=ppt/slides/slide31.xml><?xml version="1.0" encoding="utf-8"?>
 <p:sld xmlns:a="http://schemas.openxmlformats.org/drawingml/2006/main" xmlns:r="http://schemas.openxmlformats.org/officeDocument/2006/relationships" xmlns:p="http://schemas.openxmlformats.org/presentationml/2006/main">
   <p:cSld>
     <p:spTree>
@@ -30297,7 +33306,7 @@
                 </a:effectLst>
                 <a:latin typeface="+mj-lt"/>
               </a:rPr>
-              <a:t>Scenario 1: Year-wise Source breakdown</a:t>
+              <a:t>Scenario 3: Year-wise Source breakdown</a:t>
             </a:r>
           </a:p>
         </p:txBody>
@@ -30345,7 +33354,7 @@
 </p:sld>
 </file>
 
-<file path=ppt/slides/slide22.xml><?xml version="1.0" encoding="utf-8"?>
+<file path=ppt/slides/slide32.xml><?xml version="1.0" encoding="utf-8"?>
 <p:sld xmlns:a="http://schemas.openxmlformats.org/drawingml/2006/main" xmlns:r="http://schemas.openxmlformats.org/officeDocument/2006/relationships" xmlns:p="http://schemas.openxmlformats.org/presentationml/2006/main">
   <p:cSld>
     <p:spTree>
@@ -30405,7 +33414,7 @@
                 </a:effectLst>
                 <a:latin typeface="+mj-lt"/>
               </a:rPr>
-              <a:t>Scenario 1: Year-wise Source breakdown</a:t>
+              <a:t>Scenario 3: Year-wise Source breakdown</a:t>
             </a:r>
           </a:p>
         </p:txBody>
@@ -30453,7 +33462,7 @@
 </p:sld>
 </file>
 
-<file path=ppt/slides/slide23.xml><?xml version="1.0" encoding="utf-8"?>
+<file path=ppt/slides/slide33.xml><?xml version="1.0" encoding="utf-8"?>
 <p:sld xmlns:a="http://schemas.openxmlformats.org/drawingml/2006/main" xmlns:r="http://schemas.openxmlformats.org/officeDocument/2006/relationships" xmlns:p="http://schemas.openxmlformats.org/presentationml/2006/main">
   <p:cSld>
     <p:spTree>
@@ -30562,31 +33571,37 @@
         </p:spPr>
         <p:txBody>
           <a:bodyPr>
-            <a:normAutofit/>
+            <a:normAutofit lnSpcReduction="10000"/>
           </a:bodyPr>
           <a:lstStyle/>
           <a:p>
             <a:r>
               <a:rPr lang="en-US" sz="2800" dirty="0"/>
-              <a:t>Scenario 1 has been created using large installation of PV and BESS as primary sources with DG strictly providing backup.</a:t>
+              <a:t>Scenario 1 has been created using a vendor-recommendation configuration</a:t>
             </a:r>
           </a:p>
           <a:p>
             <a:r>
               <a:rPr lang="en-US" dirty="0"/>
-              <a:t>Adding all BESS and PV capacity in Year 1 is disadvantageous and the full capacities cannot be utilized because of lower demands in the early years.</a:t>
+              <a:t>We see that recommendation configuration is not viable as it fails on all evaluation metrics.</a:t>
             </a:r>
           </a:p>
           <a:p>
             <a:r>
               <a:rPr lang="en-US" dirty="0"/>
-              <a:t>PV and BESS capacity is added as load is increased.</a:t>
+              <a:t>Scenario 2 finds a configuration of sources that meet fulfilment, performance and reliability KPIs. However, due to over-capacity in early years, the unit cost of energy produced is high.</a:t>
             </a:r>
           </a:p>
           <a:p>
             <a:r>
               <a:rPr lang="en-US" dirty="0"/>
-              <a:t>Based on Solar profile received from SECMC, there are multiple times during the year in which solar output is very low. These days are scattered throughout the year (cloudy weather) but occur with severity in July/ August. Because of these, solar cannot adequately charge BESS during the day, due to which diesel is run to charge batteries</a:t>
+              <a:t>Scenario-3 optimizes Scenario 2 and provides a phased plan to build the required capacity of solar PV and BESS sources keeping unit costs consistently around $0.2/kWh</a:t>
+            </a:r>
+          </a:p>
+          <a:p>
+            <a:r>
+              <a:rPr lang="en-US" dirty="0"/>
+              <a:t>We recommend SECMC to move towards procurement using the configuration of Scenario-3.</a:t>
             </a:r>
           </a:p>
           <a:p>
@@ -30600,7 +33615,7 @@
     </p:spTree>
     <p:extLst>
       <p:ext uri="{BB962C8B-B14F-4D97-AF65-F5344CB8AC3E}">
-        <p14:creationId xmlns:p14="http://schemas.microsoft.com/office/powerpoint/2010/main" val="2276141871"/>
+        <p14:creationId xmlns:p14="http://schemas.microsoft.com/office/powerpoint/2010/main" val="530332440"/>
       </p:ext>
     </p:extLst>
   </p:cSld>
@@ -30610,7 +33625,7 @@
 </p:sld>
 </file>
 
-<file path=ppt/slides/slide24.xml><?xml version="1.0" encoding="utf-8"?>
+<file path=ppt/slides/slide34.xml><?xml version="1.0" encoding="utf-8"?>
 <p:sld xmlns:a="http://schemas.openxmlformats.org/drawingml/2006/main" xmlns:r="http://schemas.openxmlformats.org/officeDocument/2006/relationships" xmlns:p="http://schemas.openxmlformats.org/presentationml/2006/main">
   <p:cSld>
     <p:bg>
@@ -33705,172 +36720,6 @@
     <p:extLst>
       <p:ext uri="{BB962C8B-B14F-4D97-AF65-F5344CB8AC3E}">
         <p14:creationId xmlns:p14="http://schemas.microsoft.com/office/powerpoint/2010/main" val="3032388449"/>
-      </p:ext>
-    </p:extLst>
-  </p:cSld>
-  <p:clrMapOvr>
-    <a:masterClrMapping/>
-  </p:clrMapOvr>
-</p:sld>
-</file>
-
-<file path=ppt/slides/slide3.xml><?xml version="1.0" encoding="utf-8"?>
-<p:sld xmlns:a="http://schemas.openxmlformats.org/drawingml/2006/main" xmlns:r="http://schemas.openxmlformats.org/officeDocument/2006/relationships" xmlns:p="http://schemas.openxmlformats.org/presentationml/2006/main">
-  <p:cSld>
-    <p:spTree>
-      <p:nvGrpSpPr>
-        <p:cNvPr id="1" name=""/>
-        <p:cNvGrpSpPr/>
-        <p:nvPr/>
-      </p:nvGrpSpPr>
-      <p:grpSpPr>
-        <a:xfrm>
-          <a:off x="0" y="0"/>
-          <a:ext cx="0" cy="0"/>
-          <a:chOff x="0" y="0"/>
-          <a:chExt cx="0" cy="0"/>
-        </a:xfrm>
-      </p:grpSpPr>
-      <p:pic>
-        <p:nvPicPr>
-          <p:cNvPr id="4" name="Picture 3"/>
-          <p:cNvPicPr>
-            <a:picLocks noChangeAspect="1"/>
-          </p:cNvPicPr>
-          <p:nvPr/>
-        </p:nvPicPr>
-        <p:blipFill rotWithShape="1">
-          <a:blip r:embed="rId2" cstate="print">
-            <a:extLst>
-              <a:ext uri="{28A0092B-C50C-407E-A947-70E740481C1C}">
-                <a14:useLocalDpi xmlns:a14="http://schemas.microsoft.com/office/drawing/2010/main" val="0"/>
-              </a:ext>
-            </a:extLst>
-          </a:blip>
-          <a:srcRect l="12651" t="21159" r="61776" b="20703"/>
-          <a:stretch/>
-        </p:blipFill>
-        <p:spPr>
-          <a:xfrm>
-            <a:off x="11109277" y="114597"/>
-            <a:ext cx="951221" cy="981561"/>
-          </a:xfrm>
-          <a:prstGeom prst="rect">
-            <a:avLst/>
-          </a:prstGeom>
-        </p:spPr>
-      </p:pic>
-      <p:sp>
-        <p:nvSpPr>
-          <p:cNvPr id="9" name="Title 1">
-            <a:extLst>
-              <a:ext uri="{FF2B5EF4-FFF2-40B4-BE49-F238E27FC236}">
-                <a16:creationId xmlns:a16="http://schemas.microsoft.com/office/drawing/2014/main" id="{3B6556A0-5D81-7C5E-D3AE-660B3A863943}"/>
-              </a:ext>
-            </a:extLst>
-          </p:cNvPr>
-          <p:cNvSpPr>
-            <a:spLocks noGrp="1"/>
-          </p:cNvSpPr>
-          <p:nvPr>
-            <p:ph type="title"/>
-          </p:nvPr>
-        </p:nvSpPr>
-        <p:spPr>
-          <a:xfrm>
-            <a:off x="838200" y="234590"/>
-            <a:ext cx="10515600" cy="861568"/>
-          </a:xfrm>
-        </p:spPr>
-        <p:txBody>
-          <a:bodyPr vert="horz" lIns="91440" tIns="45720" rIns="91440" bIns="45720" rtlCol="0" anchor="ctr">
-            <a:normAutofit/>
-          </a:bodyPr>
-          <a:lstStyle/>
-          <a:p>
-            <a:r>
-              <a:rPr lang="en-US" sz="5400" b="1" dirty="0">
-                <a:solidFill>
-                  <a:srgbClr val="44546A"/>
-                </a:solidFill>
-              </a:rPr>
-              <a:t>Load Projection</a:t>
-            </a:r>
-          </a:p>
-        </p:txBody>
-      </p:sp>
-      <p:graphicFrame>
-        <p:nvGraphicFramePr>
-          <p:cNvPr id="2" name="Chart 1">
-            <a:extLst>
-              <a:ext uri="{FF2B5EF4-FFF2-40B4-BE49-F238E27FC236}">
-                <a16:creationId xmlns:a16="http://schemas.microsoft.com/office/drawing/2014/main" id="{B945382A-B513-1151-94F1-434C98813EAC}"/>
-              </a:ext>
-            </a:extLst>
-          </p:cNvPr>
-          <p:cNvGraphicFramePr>
-            <a:graphicFrameLocks/>
-          </p:cNvGraphicFramePr>
-          <p:nvPr>
-            <p:extLst>
-              <p:ext uri="{D42A27DB-BD31-4B8C-83A1-F6EECF244321}">
-                <p14:modId xmlns:p14="http://schemas.microsoft.com/office/powerpoint/2010/main" val="379220896"/>
-              </p:ext>
-            </p:extLst>
-          </p:nvPr>
-        </p:nvGraphicFramePr>
-        <p:xfrm>
-          <a:off x="1298448" y="1255039"/>
-          <a:ext cx="9595104" cy="4456527"/>
-        </p:xfrm>
-        <a:graphic>
-          <a:graphicData uri="http://schemas.openxmlformats.org/drawingml/2006/chart">
-            <c:chart xmlns:c="http://schemas.openxmlformats.org/drawingml/2006/chart" xmlns:r="http://schemas.openxmlformats.org/officeDocument/2006/relationships" r:id="rId3"/>
-          </a:graphicData>
-        </a:graphic>
-      </p:graphicFrame>
-      <p:sp>
-        <p:nvSpPr>
-          <p:cNvPr id="3" name="Content Placeholder 3">
-            <a:extLst>
-              <a:ext uri="{FF2B5EF4-FFF2-40B4-BE49-F238E27FC236}">
-                <a16:creationId xmlns:a16="http://schemas.microsoft.com/office/drawing/2014/main" id="{55EA12DF-1B4A-C724-40B2-B05DD1686164}"/>
-              </a:ext>
-            </a:extLst>
-          </p:cNvPr>
-          <p:cNvSpPr>
-            <a:spLocks noGrp="1"/>
-          </p:cNvSpPr>
-          <p:nvPr>
-            <p:ph idx="1"/>
-          </p:nvPr>
-        </p:nvSpPr>
-        <p:spPr>
-          <a:xfrm>
-            <a:off x="1298448" y="5870447"/>
-            <a:ext cx="9810829" cy="571295"/>
-          </a:xfrm>
-        </p:spPr>
-        <p:txBody>
-          <a:bodyPr>
-            <a:normAutofit fontScale="92500" lnSpcReduction="10000"/>
-          </a:bodyPr>
-          <a:lstStyle/>
-          <a:p>
-            <a:pPr marL="0" indent="0">
-              <a:buNone/>
-            </a:pPr>
-            <a:r>
-              <a:rPr lang="en-US" sz="2000" i="1" dirty="0"/>
-              <a:t>The above load projection as well as hourly load data was combined to form hourly load projections over 12 years.</a:t>
-            </a:r>
-          </a:p>
-        </p:txBody>
-      </p:sp>
-    </p:spTree>
-    <p:extLst>
-      <p:ext uri="{BB962C8B-B14F-4D97-AF65-F5344CB8AC3E}">
-        <p14:creationId xmlns:p14="http://schemas.microsoft.com/office/powerpoint/2010/main" val="1481723967"/>
       </p:ext>
     </p:extLst>
   </p:cSld>
@@ -38422,15 +41271,6 @@
 </file>
 
 <file path=customXml/item1.xml><?xml version="1.0" encoding="utf-8"?>
-<?mso-contentType ?>
-<FormTemplates xmlns="http://schemas.microsoft.com/sharepoint/v3/contenttype/forms">
-  <Display>DocumentLibraryForm</Display>
-  <Edit>DocumentLibraryForm</Edit>
-  <New>DocumentLibraryForm</New>
-</FormTemplates>
-</file>
-
-<file path=customXml/item2.xml><?xml version="1.0" encoding="utf-8"?>
 <p:properties xmlns:p="http://schemas.microsoft.com/office/2006/metadata/properties" xmlns:xsi="http://www.w3.org/2001/XMLSchema-instance" xmlns:pc="http://schemas.microsoft.com/office/infopath/2007/PartnerControls">
   <documentManagement>
     <_Flow_SignoffStatus xmlns="ad74739f-b6c5-48e8-a4a2-e396fec78e6b" xsi:nil="true"/>
@@ -38442,6 +41282,15 @@
     <NUMBER xmlns="ad74739f-b6c5-48e8-a4a2-e396fec78e6b" xsi:nil="true"/>
   </documentManagement>
 </p:properties>
+</file>
+
+<file path=customXml/item2.xml><?xml version="1.0" encoding="utf-8"?>
+<?mso-contentType ?>
+<FormTemplates xmlns="http://schemas.microsoft.com/sharepoint/v3/contenttype/forms">
+  <Display>DocumentLibraryForm</Display>
+  <Edit>DocumentLibraryForm</Edit>
+  <New>DocumentLibraryForm</New>
+</FormTemplates>
 </file>
 
 <file path=customXml/item3.xml><?xml version="1.0" encoding="utf-8"?>
@@ -38712,14 +41561,6 @@
 </file>
 
 <file path=customXml/itemProps1.xml><?xml version="1.0" encoding="utf-8"?>
-<ds:datastoreItem xmlns:ds="http://schemas.openxmlformats.org/officeDocument/2006/customXml" ds:itemID="{64F6A5F1-517B-417C-A6AE-BFCE41BA08D6}">
-  <ds:schemaRefs>
-    <ds:schemaRef ds:uri="http://schemas.microsoft.com/sharepoint/v3/contenttype/forms"/>
-  </ds:schemaRefs>
-</ds:datastoreItem>
-</file>
-
-<file path=customXml/itemProps2.xml><?xml version="1.0" encoding="utf-8"?>
 <ds:datastoreItem xmlns:ds="http://schemas.openxmlformats.org/officeDocument/2006/customXml" ds:itemID="{6B44A797-21FB-4AE4-9506-A9FC68D2F6B2}">
   <ds:schemaRefs>
     <ds:schemaRef ds:uri="http://schemas.openxmlformats.org/package/2006/metadata/core-properties"/>
@@ -38732,6 +41573,14 @@
     <ds:schemaRef ds:uri="http://schemas.microsoft.com/office/2006/documentManagement/types"/>
     <ds:schemaRef ds:uri="http://schemas.microsoft.com/office/2006/metadata/properties"/>
     <ds:schemaRef ds:uri="http://www.w3.org/XML/1998/namespace"/>
+  </ds:schemaRefs>
+</ds:datastoreItem>
+</file>
+
+<file path=customXml/itemProps2.xml><?xml version="1.0" encoding="utf-8"?>
+<ds:datastoreItem xmlns:ds="http://schemas.openxmlformats.org/officeDocument/2006/customXml" ds:itemID="{64F6A5F1-517B-417C-A6AE-BFCE41BA08D6}">
+  <ds:schemaRefs>
+    <ds:schemaRef ds:uri="http://schemas.microsoft.com/sharepoint/v3/contenttype/forms"/>
   </ds:schemaRefs>
 </ds:datastoreItem>
 </file>

</xml_diff>